<commit_message>
Added first draft of back log
</commit_message>
<xml_diff>
--- a/docs/Slides/src/Images.pptx
+++ b/docs/Slides/src/Images.pptx
@@ -6,6 +6,8 @@
   </p:sldMasterIdLst>
   <p:sldIdLst>
     <p:sldId id="256" r:id="rId2"/>
+    <p:sldId id="257" r:id="rId3"/>
+    <p:sldId id="258" r:id="rId4"/>
   </p:sldIdLst>
   <p:sldSz cx="12192000" cy="6858000"/>
   <p:notesSz cx="6858000" cy="9144000"/>
@@ -104,6 +106,11 @@
       </a:defRPr>
     </a:lvl9pPr>
   </p:defaultTextStyle>
+  <p:extLst>
+    <p:ext uri="{EFAFB233-063F-42B5-8137-9DF3F51BA10A}">
+      <p15:sldGuideLst xmlns:p15="http://schemas.microsoft.com/office/powerpoint/2012/main"/>
+    </p:ext>
+  </p:extLst>
 </p:presentation>
 </file>
 
@@ -238,7 +245,7 @@
           <a:p>
             <a:fld id="{65CC5671-CEB6-4333-95C8-35B67CCC7D16}" type="datetimeFigureOut">
               <a:rPr lang="en-US" smtClean="0"/>
-              <a:t>5/13/2017</a:t>
+              <a:t>5/27/2017</a:t>
             </a:fld>
             <a:endParaRPr lang="en-US"/>
           </a:p>
@@ -408,7 +415,7 @@
           <a:p>
             <a:fld id="{65CC5671-CEB6-4333-95C8-35B67CCC7D16}" type="datetimeFigureOut">
               <a:rPr lang="en-US" smtClean="0"/>
-              <a:t>5/13/2017</a:t>
+              <a:t>5/27/2017</a:t>
             </a:fld>
             <a:endParaRPr lang="en-US"/>
           </a:p>
@@ -588,7 +595,7 @@
           <a:p>
             <a:fld id="{65CC5671-CEB6-4333-95C8-35B67CCC7D16}" type="datetimeFigureOut">
               <a:rPr lang="en-US" smtClean="0"/>
-              <a:t>5/13/2017</a:t>
+              <a:t>5/27/2017</a:t>
             </a:fld>
             <a:endParaRPr lang="en-US"/>
           </a:p>
@@ -758,7 +765,7 @@
           <a:p>
             <a:fld id="{65CC5671-CEB6-4333-95C8-35B67CCC7D16}" type="datetimeFigureOut">
               <a:rPr lang="en-US" smtClean="0"/>
-              <a:t>5/13/2017</a:t>
+              <a:t>5/27/2017</a:t>
             </a:fld>
             <a:endParaRPr lang="en-US"/>
           </a:p>
@@ -1004,7 +1011,7 @@
           <a:p>
             <a:fld id="{65CC5671-CEB6-4333-95C8-35B67CCC7D16}" type="datetimeFigureOut">
               <a:rPr lang="en-US" smtClean="0"/>
-              <a:t>5/13/2017</a:t>
+              <a:t>5/27/2017</a:t>
             </a:fld>
             <a:endParaRPr lang="en-US"/>
           </a:p>
@@ -1236,7 +1243,7 @@
           <a:p>
             <a:fld id="{65CC5671-CEB6-4333-95C8-35B67CCC7D16}" type="datetimeFigureOut">
               <a:rPr lang="en-US" smtClean="0"/>
-              <a:t>5/13/2017</a:t>
+              <a:t>5/27/2017</a:t>
             </a:fld>
             <a:endParaRPr lang="en-US"/>
           </a:p>
@@ -1603,7 +1610,7 @@
           <a:p>
             <a:fld id="{65CC5671-CEB6-4333-95C8-35B67CCC7D16}" type="datetimeFigureOut">
               <a:rPr lang="en-US" smtClean="0"/>
-              <a:t>5/13/2017</a:t>
+              <a:t>5/27/2017</a:t>
             </a:fld>
             <a:endParaRPr lang="en-US"/>
           </a:p>
@@ -1721,7 +1728,7 @@
           <a:p>
             <a:fld id="{65CC5671-CEB6-4333-95C8-35B67CCC7D16}" type="datetimeFigureOut">
               <a:rPr lang="en-US" smtClean="0"/>
-              <a:t>5/13/2017</a:t>
+              <a:t>5/27/2017</a:t>
             </a:fld>
             <a:endParaRPr lang="en-US"/>
           </a:p>
@@ -1816,7 +1823,7 @@
           <a:p>
             <a:fld id="{65CC5671-CEB6-4333-95C8-35B67CCC7D16}" type="datetimeFigureOut">
               <a:rPr lang="en-US" smtClean="0"/>
-              <a:t>5/13/2017</a:t>
+              <a:t>5/27/2017</a:t>
             </a:fld>
             <a:endParaRPr lang="en-US"/>
           </a:p>
@@ -2093,7 +2100,7 @@
           <a:p>
             <a:fld id="{65CC5671-CEB6-4333-95C8-35B67CCC7D16}" type="datetimeFigureOut">
               <a:rPr lang="en-US" smtClean="0"/>
-              <a:t>5/13/2017</a:t>
+              <a:t>5/27/2017</a:t>
             </a:fld>
             <a:endParaRPr lang="en-US"/>
           </a:p>
@@ -2346,7 +2353,7 @@
           <a:p>
             <a:fld id="{65CC5671-CEB6-4333-95C8-35B67CCC7D16}" type="datetimeFigureOut">
               <a:rPr lang="en-US" smtClean="0"/>
-              <a:t>5/13/2017</a:t>
+              <a:t>5/27/2017</a:t>
             </a:fld>
             <a:endParaRPr lang="en-US"/>
           </a:p>
@@ -2559,7 +2566,7 @@
           <a:p>
             <a:fld id="{65CC5671-CEB6-4333-95C8-35B67CCC7D16}" type="datetimeFigureOut">
               <a:rPr lang="en-US" smtClean="0"/>
-              <a:t>5/13/2017</a:t>
+              <a:t>5/27/2017</a:t>
             </a:fld>
             <a:endParaRPr lang="en-US"/>
           </a:p>
@@ -3628,6 +3635,2983 @@
 </p:sld>
 </file>
 
+<file path=ppt/slides/slide2.xml><?xml version="1.0" encoding="utf-8"?>
+<p:sld xmlns:a="http://schemas.openxmlformats.org/drawingml/2006/main" xmlns:r="http://schemas.openxmlformats.org/officeDocument/2006/relationships" xmlns:p="http://schemas.openxmlformats.org/presentationml/2006/main">
+  <p:cSld>
+    <p:spTree>
+      <p:nvGrpSpPr>
+        <p:cNvPr id="1" name=""/>
+        <p:cNvGrpSpPr/>
+        <p:nvPr/>
+      </p:nvGrpSpPr>
+      <p:grpSpPr>
+        <a:xfrm>
+          <a:off x="0" y="0"/>
+          <a:ext cx="0" cy="0"/>
+          <a:chOff x="0" y="0"/>
+          <a:chExt cx="0" cy="0"/>
+        </a:xfrm>
+      </p:grpSpPr>
+      <p:sp>
+        <p:nvSpPr>
+          <p:cNvPr id="4" name="Rectangle 3"/>
+          <p:cNvSpPr/>
+          <p:nvPr/>
+        </p:nvSpPr>
+        <p:spPr>
+          <a:xfrm>
+            <a:off x="989046" y="1268965"/>
+            <a:ext cx="727788" cy="373223"/>
+          </a:xfrm>
+          <a:prstGeom prst="rect">
+            <a:avLst/>
+          </a:prstGeom>
+        </p:spPr>
+        <p:style>
+          <a:lnRef idx="1">
+            <a:schemeClr val="accent1"/>
+          </a:lnRef>
+          <a:fillRef idx="2">
+            <a:schemeClr val="accent1"/>
+          </a:fillRef>
+          <a:effectRef idx="1">
+            <a:schemeClr val="accent1"/>
+          </a:effectRef>
+          <a:fontRef idx="minor">
+            <a:schemeClr val="dk1"/>
+          </a:fontRef>
+        </p:style>
+        <p:txBody>
+          <a:bodyPr rtlCol="0" anchor="ctr"/>
+          <a:lstStyle/>
+          <a:p>
+            <a:pPr algn="ctr"/>
+            <a:r>
+              <a:rPr lang="en-US" sz="1200" dirty="0" smtClean="0"/>
+              <a:t>1 - Jan</a:t>
+            </a:r>
+            <a:endParaRPr lang="en-US" sz="1200" dirty="0"/>
+          </a:p>
+        </p:txBody>
+      </p:sp>
+      <p:sp>
+        <p:nvSpPr>
+          <p:cNvPr id="5" name="Rectangle 4"/>
+          <p:cNvSpPr/>
+          <p:nvPr/>
+        </p:nvSpPr>
+        <p:spPr>
+          <a:xfrm>
+            <a:off x="1785259" y="1268965"/>
+            <a:ext cx="727788" cy="373223"/>
+          </a:xfrm>
+          <a:prstGeom prst="rect">
+            <a:avLst/>
+          </a:prstGeom>
+        </p:spPr>
+        <p:style>
+          <a:lnRef idx="1">
+            <a:schemeClr val="accent1"/>
+          </a:lnRef>
+          <a:fillRef idx="2">
+            <a:schemeClr val="accent1"/>
+          </a:fillRef>
+          <a:effectRef idx="1">
+            <a:schemeClr val="accent1"/>
+          </a:effectRef>
+          <a:fontRef idx="minor">
+            <a:schemeClr val="dk1"/>
+          </a:fontRef>
+        </p:style>
+        <p:txBody>
+          <a:bodyPr rtlCol="0" anchor="ctr"/>
+          <a:lstStyle/>
+          <a:p>
+            <a:pPr algn="ctr"/>
+            <a:r>
+              <a:rPr lang="en-US" sz="1200" dirty="0"/>
+              <a:t>2</a:t>
+            </a:r>
+            <a:r>
+              <a:rPr lang="en-US" sz="1200" dirty="0" smtClean="0"/>
+              <a:t> - Feb</a:t>
+            </a:r>
+            <a:endParaRPr lang="en-US" sz="1200" dirty="0"/>
+          </a:p>
+        </p:txBody>
+      </p:sp>
+      <p:sp>
+        <p:nvSpPr>
+          <p:cNvPr id="6" name="Rectangle 5"/>
+          <p:cNvSpPr/>
+          <p:nvPr/>
+        </p:nvSpPr>
+        <p:spPr>
+          <a:xfrm>
+            <a:off x="2581472" y="1268965"/>
+            <a:ext cx="727788" cy="373223"/>
+          </a:xfrm>
+          <a:prstGeom prst="rect">
+            <a:avLst/>
+          </a:prstGeom>
+        </p:spPr>
+        <p:style>
+          <a:lnRef idx="1">
+            <a:schemeClr val="accent1"/>
+          </a:lnRef>
+          <a:fillRef idx="2">
+            <a:schemeClr val="accent1"/>
+          </a:fillRef>
+          <a:effectRef idx="1">
+            <a:schemeClr val="accent1"/>
+          </a:effectRef>
+          <a:fontRef idx="minor">
+            <a:schemeClr val="dk1"/>
+          </a:fontRef>
+        </p:style>
+        <p:txBody>
+          <a:bodyPr rtlCol="0" anchor="ctr"/>
+          <a:lstStyle/>
+          <a:p>
+            <a:pPr algn="ctr"/>
+            <a:r>
+              <a:rPr lang="en-US" sz="1200" dirty="0" smtClean="0"/>
+              <a:t>3 - Mar</a:t>
+            </a:r>
+            <a:endParaRPr lang="en-US" sz="1200" dirty="0"/>
+          </a:p>
+        </p:txBody>
+      </p:sp>
+      <p:sp>
+        <p:nvSpPr>
+          <p:cNvPr id="7" name="Rectangle 6"/>
+          <p:cNvSpPr/>
+          <p:nvPr/>
+        </p:nvSpPr>
+        <p:spPr>
+          <a:xfrm>
+            <a:off x="3377685" y="1268965"/>
+            <a:ext cx="727788" cy="373223"/>
+          </a:xfrm>
+          <a:prstGeom prst="rect">
+            <a:avLst/>
+          </a:prstGeom>
+        </p:spPr>
+        <p:style>
+          <a:lnRef idx="1">
+            <a:schemeClr val="accent2"/>
+          </a:lnRef>
+          <a:fillRef idx="2">
+            <a:schemeClr val="accent2"/>
+          </a:fillRef>
+          <a:effectRef idx="1">
+            <a:schemeClr val="accent2"/>
+          </a:effectRef>
+          <a:fontRef idx="minor">
+            <a:schemeClr val="dk1"/>
+          </a:fontRef>
+        </p:style>
+        <p:txBody>
+          <a:bodyPr rtlCol="0" anchor="ctr"/>
+          <a:lstStyle/>
+          <a:p>
+            <a:pPr algn="ctr"/>
+            <a:r>
+              <a:rPr lang="en-US" sz="1200" dirty="0" smtClean="0"/>
+              <a:t>4 - Apr</a:t>
+            </a:r>
+            <a:endParaRPr lang="en-US" sz="1200" dirty="0"/>
+          </a:p>
+        </p:txBody>
+      </p:sp>
+      <p:sp>
+        <p:nvSpPr>
+          <p:cNvPr id="8" name="Rectangle 7"/>
+          <p:cNvSpPr/>
+          <p:nvPr/>
+        </p:nvSpPr>
+        <p:spPr>
+          <a:xfrm>
+            <a:off x="4173898" y="1268965"/>
+            <a:ext cx="727788" cy="373223"/>
+          </a:xfrm>
+          <a:prstGeom prst="rect">
+            <a:avLst/>
+          </a:prstGeom>
+        </p:spPr>
+        <p:style>
+          <a:lnRef idx="1">
+            <a:schemeClr val="accent2"/>
+          </a:lnRef>
+          <a:fillRef idx="2">
+            <a:schemeClr val="accent2"/>
+          </a:fillRef>
+          <a:effectRef idx="1">
+            <a:schemeClr val="accent2"/>
+          </a:effectRef>
+          <a:fontRef idx="minor">
+            <a:schemeClr val="dk1"/>
+          </a:fontRef>
+        </p:style>
+        <p:txBody>
+          <a:bodyPr rtlCol="0" anchor="ctr"/>
+          <a:lstStyle/>
+          <a:p>
+            <a:pPr algn="ctr"/>
+            <a:r>
+              <a:rPr lang="en-US" sz="1200" dirty="0"/>
+              <a:t>5</a:t>
+            </a:r>
+            <a:r>
+              <a:rPr lang="en-US" sz="1200" dirty="0" smtClean="0"/>
+              <a:t> - May</a:t>
+            </a:r>
+            <a:endParaRPr lang="en-US" sz="1200" dirty="0"/>
+          </a:p>
+        </p:txBody>
+      </p:sp>
+      <p:sp>
+        <p:nvSpPr>
+          <p:cNvPr id="9" name="Rectangle 8"/>
+          <p:cNvSpPr/>
+          <p:nvPr/>
+        </p:nvSpPr>
+        <p:spPr>
+          <a:xfrm>
+            <a:off x="4970111" y="1268965"/>
+            <a:ext cx="727788" cy="373223"/>
+          </a:xfrm>
+          <a:prstGeom prst="rect">
+            <a:avLst/>
+          </a:prstGeom>
+        </p:spPr>
+        <p:style>
+          <a:lnRef idx="1">
+            <a:schemeClr val="accent2"/>
+          </a:lnRef>
+          <a:fillRef idx="2">
+            <a:schemeClr val="accent2"/>
+          </a:fillRef>
+          <a:effectRef idx="1">
+            <a:schemeClr val="accent2"/>
+          </a:effectRef>
+          <a:fontRef idx="minor">
+            <a:schemeClr val="dk1"/>
+          </a:fontRef>
+        </p:style>
+        <p:txBody>
+          <a:bodyPr rtlCol="0" anchor="ctr"/>
+          <a:lstStyle/>
+          <a:p>
+            <a:pPr algn="ctr"/>
+            <a:r>
+              <a:rPr lang="en-US" sz="1200" dirty="0" smtClean="0"/>
+              <a:t>6 - Jun</a:t>
+            </a:r>
+            <a:endParaRPr lang="en-US" sz="1200" dirty="0"/>
+          </a:p>
+        </p:txBody>
+      </p:sp>
+      <p:sp>
+        <p:nvSpPr>
+          <p:cNvPr id="10" name="Rectangle 9"/>
+          <p:cNvSpPr/>
+          <p:nvPr/>
+        </p:nvSpPr>
+        <p:spPr>
+          <a:xfrm>
+            <a:off x="5766324" y="1268965"/>
+            <a:ext cx="727788" cy="373223"/>
+          </a:xfrm>
+          <a:prstGeom prst="rect">
+            <a:avLst/>
+          </a:prstGeom>
+        </p:spPr>
+        <p:style>
+          <a:lnRef idx="1">
+            <a:schemeClr val="accent4"/>
+          </a:lnRef>
+          <a:fillRef idx="2">
+            <a:schemeClr val="accent4"/>
+          </a:fillRef>
+          <a:effectRef idx="1">
+            <a:schemeClr val="accent4"/>
+          </a:effectRef>
+          <a:fontRef idx="minor">
+            <a:schemeClr val="dk1"/>
+          </a:fontRef>
+        </p:style>
+        <p:txBody>
+          <a:bodyPr rtlCol="0" anchor="ctr"/>
+          <a:lstStyle/>
+          <a:p>
+            <a:pPr algn="ctr"/>
+            <a:r>
+              <a:rPr lang="en-US" sz="1200" dirty="0" smtClean="0"/>
+              <a:t>7 - Jul</a:t>
+            </a:r>
+            <a:endParaRPr lang="en-US" sz="1200" dirty="0"/>
+          </a:p>
+        </p:txBody>
+      </p:sp>
+      <p:sp>
+        <p:nvSpPr>
+          <p:cNvPr id="11" name="Rectangle 10"/>
+          <p:cNvSpPr/>
+          <p:nvPr/>
+        </p:nvSpPr>
+        <p:spPr>
+          <a:xfrm>
+            <a:off x="6562537" y="1268964"/>
+            <a:ext cx="727788" cy="373223"/>
+          </a:xfrm>
+          <a:prstGeom prst="rect">
+            <a:avLst/>
+          </a:prstGeom>
+        </p:spPr>
+        <p:style>
+          <a:lnRef idx="1">
+            <a:schemeClr val="accent4"/>
+          </a:lnRef>
+          <a:fillRef idx="2">
+            <a:schemeClr val="accent4"/>
+          </a:fillRef>
+          <a:effectRef idx="1">
+            <a:schemeClr val="accent4"/>
+          </a:effectRef>
+          <a:fontRef idx="minor">
+            <a:schemeClr val="dk1"/>
+          </a:fontRef>
+        </p:style>
+        <p:txBody>
+          <a:bodyPr rtlCol="0" anchor="ctr"/>
+          <a:lstStyle/>
+          <a:p>
+            <a:pPr algn="ctr"/>
+            <a:r>
+              <a:rPr lang="en-US" sz="1200" dirty="0"/>
+              <a:t>8</a:t>
+            </a:r>
+            <a:r>
+              <a:rPr lang="en-US" sz="1200" dirty="0" smtClean="0"/>
+              <a:t> - Aug</a:t>
+            </a:r>
+            <a:endParaRPr lang="en-US" sz="1200" dirty="0"/>
+          </a:p>
+        </p:txBody>
+      </p:sp>
+      <p:sp>
+        <p:nvSpPr>
+          <p:cNvPr id="12" name="Rectangle 11"/>
+          <p:cNvSpPr/>
+          <p:nvPr/>
+        </p:nvSpPr>
+        <p:spPr>
+          <a:xfrm>
+            <a:off x="7358750" y="1268964"/>
+            <a:ext cx="727788" cy="373223"/>
+          </a:xfrm>
+          <a:prstGeom prst="rect">
+            <a:avLst/>
+          </a:prstGeom>
+        </p:spPr>
+        <p:style>
+          <a:lnRef idx="1">
+            <a:schemeClr val="accent4"/>
+          </a:lnRef>
+          <a:fillRef idx="2">
+            <a:schemeClr val="accent4"/>
+          </a:fillRef>
+          <a:effectRef idx="1">
+            <a:schemeClr val="accent4"/>
+          </a:effectRef>
+          <a:fontRef idx="minor">
+            <a:schemeClr val="dk1"/>
+          </a:fontRef>
+        </p:style>
+        <p:txBody>
+          <a:bodyPr rtlCol="0" anchor="ctr"/>
+          <a:lstStyle/>
+          <a:p>
+            <a:pPr algn="ctr"/>
+            <a:r>
+              <a:rPr lang="en-US" sz="1200" dirty="0"/>
+              <a:t>9</a:t>
+            </a:r>
+            <a:r>
+              <a:rPr lang="en-US" sz="1200" dirty="0" smtClean="0"/>
+              <a:t> - Sep</a:t>
+            </a:r>
+            <a:endParaRPr lang="en-US" sz="1200" dirty="0"/>
+          </a:p>
+        </p:txBody>
+      </p:sp>
+      <p:sp>
+        <p:nvSpPr>
+          <p:cNvPr id="13" name="Rectangle 12"/>
+          <p:cNvSpPr/>
+          <p:nvPr/>
+        </p:nvSpPr>
+        <p:spPr>
+          <a:xfrm>
+            <a:off x="8154963" y="1268963"/>
+            <a:ext cx="727788" cy="373223"/>
+          </a:xfrm>
+          <a:prstGeom prst="rect">
+            <a:avLst/>
+          </a:prstGeom>
+        </p:spPr>
+        <p:style>
+          <a:lnRef idx="1">
+            <a:schemeClr val="accent6"/>
+          </a:lnRef>
+          <a:fillRef idx="2">
+            <a:schemeClr val="accent6"/>
+          </a:fillRef>
+          <a:effectRef idx="1">
+            <a:schemeClr val="accent6"/>
+          </a:effectRef>
+          <a:fontRef idx="minor">
+            <a:schemeClr val="dk1"/>
+          </a:fontRef>
+        </p:style>
+        <p:txBody>
+          <a:bodyPr rtlCol="0" anchor="ctr"/>
+          <a:lstStyle/>
+          <a:p>
+            <a:pPr algn="ctr"/>
+            <a:r>
+              <a:rPr lang="en-US" sz="1200" dirty="0" smtClean="0"/>
+              <a:t>10 - Oct</a:t>
+            </a:r>
+            <a:endParaRPr lang="en-US" sz="1200" dirty="0"/>
+          </a:p>
+        </p:txBody>
+      </p:sp>
+      <p:sp>
+        <p:nvSpPr>
+          <p:cNvPr id="14" name="Rectangle 13"/>
+          <p:cNvSpPr/>
+          <p:nvPr/>
+        </p:nvSpPr>
+        <p:spPr>
+          <a:xfrm>
+            <a:off x="8951176" y="1268964"/>
+            <a:ext cx="727788" cy="373223"/>
+          </a:xfrm>
+          <a:prstGeom prst="rect">
+            <a:avLst/>
+          </a:prstGeom>
+        </p:spPr>
+        <p:style>
+          <a:lnRef idx="1">
+            <a:schemeClr val="accent6"/>
+          </a:lnRef>
+          <a:fillRef idx="2">
+            <a:schemeClr val="accent6"/>
+          </a:fillRef>
+          <a:effectRef idx="1">
+            <a:schemeClr val="accent6"/>
+          </a:effectRef>
+          <a:fontRef idx="minor">
+            <a:schemeClr val="dk1"/>
+          </a:fontRef>
+        </p:style>
+        <p:txBody>
+          <a:bodyPr rtlCol="0" anchor="ctr"/>
+          <a:lstStyle/>
+          <a:p>
+            <a:pPr algn="ctr"/>
+            <a:r>
+              <a:rPr lang="en-US" sz="1200" dirty="0" smtClean="0"/>
+              <a:t>11 - Nov</a:t>
+            </a:r>
+            <a:endParaRPr lang="en-US" sz="1200" dirty="0"/>
+          </a:p>
+        </p:txBody>
+      </p:sp>
+      <p:sp>
+        <p:nvSpPr>
+          <p:cNvPr id="15" name="Rectangle 14"/>
+          <p:cNvSpPr/>
+          <p:nvPr/>
+        </p:nvSpPr>
+        <p:spPr>
+          <a:xfrm>
+            <a:off x="9747389" y="1268963"/>
+            <a:ext cx="727788" cy="373223"/>
+          </a:xfrm>
+          <a:prstGeom prst="rect">
+            <a:avLst/>
+          </a:prstGeom>
+        </p:spPr>
+        <p:style>
+          <a:lnRef idx="1">
+            <a:schemeClr val="accent6"/>
+          </a:lnRef>
+          <a:fillRef idx="2">
+            <a:schemeClr val="accent6"/>
+          </a:fillRef>
+          <a:effectRef idx="1">
+            <a:schemeClr val="accent6"/>
+          </a:effectRef>
+          <a:fontRef idx="minor">
+            <a:schemeClr val="dk1"/>
+          </a:fontRef>
+        </p:style>
+        <p:txBody>
+          <a:bodyPr rtlCol="0" anchor="ctr"/>
+          <a:lstStyle/>
+          <a:p>
+            <a:pPr algn="ctr"/>
+            <a:r>
+              <a:rPr lang="en-US" sz="1200" dirty="0" smtClean="0"/>
+              <a:t>12 - Dec</a:t>
+            </a:r>
+            <a:endParaRPr lang="en-US" sz="1200" dirty="0"/>
+          </a:p>
+        </p:txBody>
+      </p:sp>
+      <p:sp>
+        <p:nvSpPr>
+          <p:cNvPr id="18" name="Rectangle 17"/>
+          <p:cNvSpPr/>
+          <p:nvPr/>
+        </p:nvSpPr>
+        <p:spPr>
+          <a:xfrm>
+            <a:off x="989046" y="2177144"/>
+            <a:ext cx="727788" cy="373223"/>
+          </a:xfrm>
+          <a:prstGeom prst="rect">
+            <a:avLst/>
+          </a:prstGeom>
+        </p:spPr>
+        <p:style>
+          <a:lnRef idx="1">
+            <a:schemeClr val="accent1"/>
+          </a:lnRef>
+          <a:fillRef idx="2">
+            <a:schemeClr val="accent1"/>
+          </a:fillRef>
+          <a:effectRef idx="1">
+            <a:schemeClr val="accent1"/>
+          </a:effectRef>
+          <a:fontRef idx="minor">
+            <a:schemeClr val="dk1"/>
+          </a:fontRef>
+        </p:style>
+        <p:txBody>
+          <a:bodyPr rtlCol="0" anchor="ctr"/>
+          <a:lstStyle/>
+          <a:p>
+            <a:pPr algn="ctr"/>
+            <a:r>
+              <a:rPr lang="en-US" sz="1200" dirty="0" smtClean="0"/>
+              <a:t>1 - Jan</a:t>
+            </a:r>
+            <a:endParaRPr lang="en-US" sz="1200" dirty="0"/>
+          </a:p>
+        </p:txBody>
+      </p:sp>
+      <p:sp>
+        <p:nvSpPr>
+          <p:cNvPr id="19" name="Rectangle 18"/>
+          <p:cNvSpPr/>
+          <p:nvPr/>
+        </p:nvSpPr>
+        <p:spPr>
+          <a:xfrm>
+            <a:off x="1785259" y="2177144"/>
+            <a:ext cx="727788" cy="373223"/>
+          </a:xfrm>
+          <a:prstGeom prst="rect">
+            <a:avLst/>
+          </a:prstGeom>
+        </p:spPr>
+        <p:style>
+          <a:lnRef idx="1">
+            <a:schemeClr val="accent1"/>
+          </a:lnRef>
+          <a:fillRef idx="2">
+            <a:schemeClr val="accent1"/>
+          </a:fillRef>
+          <a:effectRef idx="1">
+            <a:schemeClr val="accent1"/>
+          </a:effectRef>
+          <a:fontRef idx="minor">
+            <a:schemeClr val="dk1"/>
+          </a:fontRef>
+        </p:style>
+        <p:txBody>
+          <a:bodyPr rtlCol="0" anchor="ctr"/>
+          <a:lstStyle/>
+          <a:p>
+            <a:pPr algn="ctr"/>
+            <a:r>
+              <a:rPr lang="en-US" sz="1200" dirty="0"/>
+              <a:t>2</a:t>
+            </a:r>
+            <a:r>
+              <a:rPr lang="en-US" sz="1200" dirty="0" smtClean="0"/>
+              <a:t> - Feb</a:t>
+            </a:r>
+            <a:endParaRPr lang="en-US" sz="1200" dirty="0"/>
+          </a:p>
+        </p:txBody>
+      </p:sp>
+      <p:sp>
+        <p:nvSpPr>
+          <p:cNvPr id="20" name="Rectangle 19"/>
+          <p:cNvSpPr/>
+          <p:nvPr/>
+        </p:nvSpPr>
+        <p:spPr>
+          <a:xfrm>
+            <a:off x="2581472" y="2177144"/>
+            <a:ext cx="727788" cy="373223"/>
+          </a:xfrm>
+          <a:prstGeom prst="rect">
+            <a:avLst/>
+          </a:prstGeom>
+        </p:spPr>
+        <p:style>
+          <a:lnRef idx="1">
+            <a:schemeClr val="accent1"/>
+          </a:lnRef>
+          <a:fillRef idx="2">
+            <a:schemeClr val="accent1"/>
+          </a:fillRef>
+          <a:effectRef idx="1">
+            <a:schemeClr val="accent1"/>
+          </a:effectRef>
+          <a:fontRef idx="minor">
+            <a:schemeClr val="dk1"/>
+          </a:fontRef>
+        </p:style>
+        <p:txBody>
+          <a:bodyPr rtlCol="0" anchor="ctr"/>
+          <a:lstStyle/>
+          <a:p>
+            <a:pPr algn="ctr"/>
+            <a:r>
+              <a:rPr lang="en-US" sz="1200" dirty="0" smtClean="0"/>
+              <a:t>3 - Mar</a:t>
+            </a:r>
+            <a:endParaRPr lang="en-US" sz="1200" dirty="0"/>
+          </a:p>
+        </p:txBody>
+      </p:sp>
+      <p:sp>
+        <p:nvSpPr>
+          <p:cNvPr id="21" name="Rectangle 20"/>
+          <p:cNvSpPr/>
+          <p:nvPr/>
+        </p:nvSpPr>
+        <p:spPr>
+          <a:xfrm>
+            <a:off x="3377685" y="2177144"/>
+            <a:ext cx="727788" cy="373223"/>
+          </a:xfrm>
+          <a:prstGeom prst="rect">
+            <a:avLst/>
+          </a:prstGeom>
+        </p:spPr>
+        <p:style>
+          <a:lnRef idx="1">
+            <a:schemeClr val="accent2"/>
+          </a:lnRef>
+          <a:fillRef idx="2">
+            <a:schemeClr val="accent2"/>
+          </a:fillRef>
+          <a:effectRef idx="1">
+            <a:schemeClr val="accent2"/>
+          </a:effectRef>
+          <a:fontRef idx="minor">
+            <a:schemeClr val="dk1"/>
+          </a:fontRef>
+        </p:style>
+        <p:txBody>
+          <a:bodyPr rtlCol="0" anchor="ctr"/>
+          <a:lstStyle/>
+          <a:p>
+            <a:pPr algn="ctr"/>
+            <a:r>
+              <a:rPr lang="en-US" sz="1200" dirty="0" smtClean="0"/>
+              <a:t>4 - Apr</a:t>
+            </a:r>
+            <a:endParaRPr lang="en-US" sz="1200" dirty="0"/>
+          </a:p>
+        </p:txBody>
+      </p:sp>
+      <p:sp>
+        <p:nvSpPr>
+          <p:cNvPr id="22" name="Rectangle 21"/>
+          <p:cNvSpPr/>
+          <p:nvPr/>
+        </p:nvSpPr>
+        <p:spPr>
+          <a:xfrm>
+            <a:off x="4173898" y="2177144"/>
+            <a:ext cx="727788" cy="373223"/>
+          </a:xfrm>
+          <a:prstGeom prst="rect">
+            <a:avLst/>
+          </a:prstGeom>
+        </p:spPr>
+        <p:style>
+          <a:lnRef idx="1">
+            <a:schemeClr val="accent2"/>
+          </a:lnRef>
+          <a:fillRef idx="2">
+            <a:schemeClr val="accent2"/>
+          </a:fillRef>
+          <a:effectRef idx="1">
+            <a:schemeClr val="accent2"/>
+          </a:effectRef>
+          <a:fontRef idx="minor">
+            <a:schemeClr val="dk1"/>
+          </a:fontRef>
+        </p:style>
+        <p:txBody>
+          <a:bodyPr rtlCol="0" anchor="ctr"/>
+          <a:lstStyle/>
+          <a:p>
+            <a:pPr algn="ctr"/>
+            <a:r>
+              <a:rPr lang="en-US" sz="1200" dirty="0"/>
+              <a:t>5</a:t>
+            </a:r>
+            <a:r>
+              <a:rPr lang="en-US" sz="1200" dirty="0" smtClean="0"/>
+              <a:t> - May</a:t>
+            </a:r>
+            <a:endParaRPr lang="en-US" sz="1200" dirty="0"/>
+          </a:p>
+        </p:txBody>
+      </p:sp>
+      <p:sp>
+        <p:nvSpPr>
+          <p:cNvPr id="23" name="Rectangle 22"/>
+          <p:cNvSpPr/>
+          <p:nvPr/>
+        </p:nvSpPr>
+        <p:spPr>
+          <a:xfrm>
+            <a:off x="4970111" y="2177144"/>
+            <a:ext cx="727788" cy="373223"/>
+          </a:xfrm>
+          <a:prstGeom prst="rect">
+            <a:avLst/>
+          </a:prstGeom>
+        </p:spPr>
+        <p:style>
+          <a:lnRef idx="1">
+            <a:schemeClr val="accent2"/>
+          </a:lnRef>
+          <a:fillRef idx="2">
+            <a:schemeClr val="accent2"/>
+          </a:fillRef>
+          <a:effectRef idx="1">
+            <a:schemeClr val="accent2"/>
+          </a:effectRef>
+          <a:fontRef idx="minor">
+            <a:schemeClr val="dk1"/>
+          </a:fontRef>
+        </p:style>
+        <p:txBody>
+          <a:bodyPr rtlCol="0" anchor="ctr"/>
+          <a:lstStyle/>
+          <a:p>
+            <a:pPr algn="ctr"/>
+            <a:r>
+              <a:rPr lang="en-US" sz="1200" dirty="0" smtClean="0"/>
+              <a:t>6 - Jun</a:t>
+            </a:r>
+            <a:endParaRPr lang="en-US" sz="1200" dirty="0"/>
+          </a:p>
+        </p:txBody>
+      </p:sp>
+      <p:sp>
+        <p:nvSpPr>
+          <p:cNvPr id="24" name="Rectangle 23"/>
+          <p:cNvSpPr/>
+          <p:nvPr/>
+        </p:nvSpPr>
+        <p:spPr>
+          <a:xfrm>
+            <a:off x="5766324" y="2177144"/>
+            <a:ext cx="727788" cy="373223"/>
+          </a:xfrm>
+          <a:prstGeom prst="rect">
+            <a:avLst/>
+          </a:prstGeom>
+        </p:spPr>
+        <p:style>
+          <a:lnRef idx="1">
+            <a:schemeClr val="accent4"/>
+          </a:lnRef>
+          <a:fillRef idx="2">
+            <a:schemeClr val="accent4"/>
+          </a:fillRef>
+          <a:effectRef idx="1">
+            <a:schemeClr val="accent4"/>
+          </a:effectRef>
+          <a:fontRef idx="minor">
+            <a:schemeClr val="dk1"/>
+          </a:fontRef>
+        </p:style>
+        <p:txBody>
+          <a:bodyPr rtlCol="0" anchor="ctr"/>
+          <a:lstStyle/>
+          <a:p>
+            <a:pPr algn="ctr"/>
+            <a:r>
+              <a:rPr lang="en-US" sz="1200" dirty="0" smtClean="0"/>
+              <a:t>7 - Jul</a:t>
+            </a:r>
+            <a:endParaRPr lang="en-US" sz="1200" dirty="0"/>
+          </a:p>
+        </p:txBody>
+      </p:sp>
+      <p:sp>
+        <p:nvSpPr>
+          <p:cNvPr id="25" name="Rectangle 24"/>
+          <p:cNvSpPr/>
+          <p:nvPr/>
+        </p:nvSpPr>
+        <p:spPr>
+          <a:xfrm>
+            <a:off x="6562537" y="2177143"/>
+            <a:ext cx="727788" cy="373223"/>
+          </a:xfrm>
+          <a:prstGeom prst="rect">
+            <a:avLst/>
+          </a:prstGeom>
+        </p:spPr>
+        <p:style>
+          <a:lnRef idx="1">
+            <a:schemeClr val="accent4"/>
+          </a:lnRef>
+          <a:fillRef idx="2">
+            <a:schemeClr val="accent4"/>
+          </a:fillRef>
+          <a:effectRef idx="1">
+            <a:schemeClr val="accent4"/>
+          </a:effectRef>
+          <a:fontRef idx="minor">
+            <a:schemeClr val="dk1"/>
+          </a:fontRef>
+        </p:style>
+        <p:txBody>
+          <a:bodyPr rtlCol="0" anchor="ctr"/>
+          <a:lstStyle/>
+          <a:p>
+            <a:pPr algn="ctr"/>
+            <a:r>
+              <a:rPr lang="en-US" sz="1200" dirty="0"/>
+              <a:t>8</a:t>
+            </a:r>
+            <a:r>
+              <a:rPr lang="en-US" sz="1200" dirty="0" smtClean="0"/>
+              <a:t> - Aug</a:t>
+            </a:r>
+            <a:endParaRPr lang="en-US" sz="1200" dirty="0"/>
+          </a:p>
+        </p:txBody>
+      </p:sp>
+      <p:sp>
+        <p:nvSpPr>
+          <p:cNvPr id="26" name="Rectangle 25"/>
+          <p:cNvSpPr/>
+          <p:nvPr/>
+        </p:nvSpPr>
+        <p:spPr>
+          <a:xfrm>
+            <a:off x="7358750" y="2177143"/>
+            <a:ext cx="727788" cy="373223"/>
+          </a:xfrm>
+          <a:prstGeom prst="rect">
+            <a:avLst/>
+          </a:prstGeom>
+        </p:spPr>
+        <p:style>
+          <a:lnRef idx="1">
+            <a:schemeClr val="accent4"/>
+          </a:lnRef>
+          <a:fillRef idx="2">
+            <a:schemeClr val="accent4"/>
+          </a:fillRef>
+          <a:effectRef idx="1">
+            <a:schemeClr val="accent4"/>
+          </a:effectRef>
+          <a:fontRef idx="minor">
+            <a:schemeClr val="dk1"/>
+          </a:fontRef>
+        </p:style>
+        <p:txBody>
+          <a:bodyPr rtlCol="0" anchor="ctr"/>
+          <a:lstStyle/>
+          <a:p>
+            <a:pPr algn="ctr"/>
+            <a:r>
+              <a:rPr lang="en-US" sz="1200" dirty="0"/>
+              <a:t>9</a:t>
+            </a:r>
+            <a:r>
+              <a:rPr lang="en-US" sz="1200" dirty="0" smtClean="0"/>
+              <a:t> - Sep</a:t>
+            </a:r>
+            <a:endParaRPr lang="en-US" sz="1200" dirty="0"/>
+          </a:p>
+        </p:txBody>
+      </p:sp>
+      <p:sp>
+        <p:nvSpPr>
+          <p:cNvPr id="27" name="Rectangle 26"/>
+          <p:cNvSpPr/>
+          <p:nvPr/>
+        </p:nvSpPr>
+        <p:spPr>
+          <a:xfrm>
+            <a:off x="8154963" y="2177142"/>
+            <a:ext cx="727788" cy="373223"/>
+          </a:xfrm>
+          <a:prstGeom prst="rect">
+            <a:avLst/>
+          </a:prstGeom>
+        </p:spPr>
+        <p:style>
+          <a:lnRef idx="1">
+            <a:schemeClr val="accent6"/>
+          </a:lnRef>
+          <a:fillRef idx="2">
+            <a:schemeClr val="accent6"/>
+          </a:fillRef>
+          <a:effectRef idx="1">
+            <a:schemeClr val="accent6"/>
+          </a:effectRef>
+          <a:fontRef idx="minor">
+            <a:schemeClr val="dk1"/>
+          </a:fontRef>
+        </p:style>
+        <p:txBody>
+          <a:bodyPr rtlCol="0" anchor="ctr"/>
+          <a:lstStyle/>
+          <a:p>
+            <a:pPr algn="ctr"/>
+            <a:r>
+              <a:rPr lang="en-US" sz="1200" dirty="0" smtClean="0"/>
+              <a:t>10 - Oct</a:t>
+            </a:r>
+            <a:endParaRPr lang="en-US" sz="1200" dirty="0"/>
+          </a:p>
+        </p:txBody>
+      </p:sp>
+      <p:sp>
+        <p:nvSpPr>
+          <p:cNvPr id="28" name="Rectangle 27"/>
+          <p:cNvSpPr/>
+          <p:nvPr/>
+        </p:nvSpPr>
+        <p:spPr>
+          <a:xfrm>
+            <a:off x="8951176" y="2177143"/>
+            <a:ext cx="727788" cy="373223"/>
+          </a:xfrm>
+          <a:prstGeom prst="rect">
+            <a:avLst/>
+          </a:prstGeom>
+        </p:spPr>
+        <p:style>
+          <a:lnRef idx="1">
+            <a:schemeClr val="accent6"/>
+          </a:lnRef>
+          <a:fillRef idx="2">
+            <a:schemeClr val="accent6"/>
+          </a:fillRef>
+          <a:effectRef idx="1">
+            <a:schemeClr val="accent6"/>
+          </a:effectRef>
+          <a:fontRef idx="minor">
+            <a:schemeClr val="dk1"/>
+          </a:fontRef>
+        </p:style>
+        <p:txBody>
+          <a:bodyPr rtlCol="0" anchor="ctr"/>
+          <a:lstStyle/>
+          <a:p>
+            <a:pPr algn="ctr"/>
+            <a:r>
+              <a:rPr lang="en-US" sz="1200" dirty="0" smtClean="0"/>
+              <a:t>11 - Nov</a:t>
+            </a:r>
+            <a:endParaRPr lang="en-US" sz="1200" dirty="0"/>
+          </a:p>
+        </p:txBody>
+      </p:sp>
+      <p:sp>
+        <p:nvSpPr>
+          <p:cNvPr id="29" name="Rectangle 28"/>
+          <p:cNvSpPr/>
+          <p:nvPr/>
+        </p:nvSpPr>
+        <p:spPr>
+          <a:xfrm>
+            <a:off x="9747389" y="2177142"/>
+            <a:ext cx="727788" cy="373223"/>
+          </a:xfrm>
+          <a:prstGeom prst="rect">
+            <a:avLst/>
+          </a:prstGeom>
+        </p:spPr>
+        <p:style>
+          <a:lnRef idx="1">
+            <a:schemeClr val="accent6"/>
+          </a:lnRef>
+          <a:fillRef idx="2">
+            <a:schemeClr val="accent6"/>
+          </a:fillRef>
+          <a:effectRef idx="1">
+            <a:schemeClr val="accent6"/>
+          </a:effectRef>
+          <a:fontRef idx="minor">
+            <a:schemeClr val="dk1"/>
+          </a:fontRef>
+        </p:style>
+        <p:txBody>
+          <a:bodyPr rtlCol="0" anchor="ctr"/>
+          <a:lstStyle/>
+          <a:p>
+            <a:pPr algn="ctr"/>
+            <a:r>
+              <a:rPr lang="en-US" sz="1200" dirty="0" smtClean="0"/>
+              <a:t>12 - Dec</a:t>
+            </a:r>
+            <a:endParaRPr lang="en-US" sz="1200" dirty="0"/>
+          </a:p>
+        </p:txBody>
+      </p:sp>
+      <p:sp>
+        <p:nvSpPr>
+          <p:cNvPr id="31" name="Rectangle 30"/>
+          <p:cNvSpPr/>
+          <p:nvPr/>
+        </p:nvSpPr>
+        <p:spPr>
+          <a:xfrm>
+            <a:off x="989046" y="3085323"/>
+            <a:ext cx="727788" cy="373223"/>
+          </a:xfrm>
+          <a:prstGeom prst="rect">
+            <a:avLst/>
+          </a:prstGeom>
+        </p:spPr>
+        <p:style>
+          <a:lnRef idx="1">
+            <a:schemeClr val="accent1"/>
+          </a:lnRef>
+          <a:fillRef idx="2">
+            <a:schemeClr val="accent1"/>
+          </a:fillRef>
+          <a:effectRef idx="1">
+            <a:schemeClr val="accent1"/>
+          </a:effectRef>
+          <a:fontRef idx="minor">
+            <a:schemeClr val="dk1"/>
+          </a:fontRef>
+        </p:style>
+        <p:txBody>
+          <a:bodyPr rtlCol="0" anchor="ctr"/>
+          <a:lstStyle/>
+          <a:p>
+            <a:pPr algn="ctr"/>
+            <a:r>
+              <a:rPr lang="en-US" sz="1200" dirty="0" smtClean="0"/>
+              <a:t>1 - Jan</a:t>
+            </a:r>
+            <a:endParaRPr lang="en-US" sz="1200" dirty="0"/>
+          </a:p>
+        </p:txBody>
+      </p:sp>
+      <p:sp>
+        <p:nvSpPr>
+          <p:cNvPr id="32" name="Rectangle 31"/>
+          <p:cNvSpPr/>
+          <p:nvPr/>
+        </p:nvSpPr>
+        <p:spPr>
+          <a:xfrm>
+            <a:off x="1785259" y="3085323"/>
+            <a:ext cx="727788" cy="373223"/>
+          </a:xfrm>
+          <a:prstGeom prst="rect">
+            <a:avLst/>
+          </a:prstGeom>
+        </p:spPr>
+        <p:style>
+          <a:lnRef idx="1">
+            <a:schemeClr val="accent1"/>
+          </a:lnRef>
+          <a:fillRef idx="2">
+            <a:schemeClr val="accent1"/>
+          </a:fillRef>
+          <a:effectRef idx="1">
+            <a:schemeClr val="accent1"/>
+          </a:effectRef>
+          <a:fontRef idx="minor">
+            <a:schemeClr val="dk1"/>
+          </a:fontRef>
+        </p:style>
+        <p:txBody>
+          <a:bodyPr rtlCol="0" anchor="ctr"/>
+          <a:lstStyle/>
+          <a:p>
+            <a:pPr algn="ctr"/>
+            <a:r>
+              <a:rPr lang="en-US" sz="1200" dirty="0"/>
+              <a:t>2</a:t>
+            </a:r>
+            <a:r>
+              <a:rPr lang="en-US" sz="1200" dirty="0" smtClean="0"/>
+              <a:t> - Feb</a:t>
+            </a:r>
+            <a:endParaRPr lang="en-US" sz="1200" dirty="0"/>
+          </a:p>
+        </p:txBody>
+      </p:sp>
+      <p:sp>
+        <p:nvSpPr>
+          <p:cNvPr id="33" name="Rectangle 32"/>
+          <p:cNvSpPr/>
+          <p:nvPr/>
+        </p:nvSpPr>
+        <p:spPr>
+          <a:xfrm>
+            <a:off x="2581472" y="3085323"/>
+            <a:ext cx="727788" cy="373223"/>
+          </a:xfrm>
+          <a:prstGeom prst="rect">
+            <a:avLst/>
+          </a:prstGeom>
+        </p:spPr>
+        <p:style>
+          <a:lnRef idx="1">
+            <a:schemeClr val="accent1"/>
+          </a:lnRef>
+          <a:fillRef idx="2">
+            <a:schemeClr val="accent1"/>
+          </a:fillRef>
+          <a:effectRef idx="1">
+            <a:schemeClr val="accent1"/>
+          </a:effectRef>
+          <a:fontRef idx="minor">
+            <a:schemeClr val="dk1"/>
+          </a:fontRef>
+        </p:style>
+        <p:txBody>
+          <a:bodyPr rtlCol="0" anchor="ctr"/>
+          <a:lstStyle/>
+          <a:p>
+            <a:pPr algn="ctr"/>
+            <a:r>
+              <a:rPr lang="en-US" sz="1200" dirty="0" smtClean="0"/>
+              <a:t>3 - Mar</a:t>
+            </a:r>
+            <a:endParaRPr lang="en-US" sz="1200" dirty="0"/>
+          </a:p>
+        </p:txBody>
+      </p:sp>
+      <p:sp>
+        <p:nvSpPr>
+          <p:cNvPr id="34" name="Rectangle 33"/>
+          <p:cNvSpPr/>
+          <p:nvPr/>
+        </p:nvSpPr>
+        <p:spPr>
+          <a:xfrm>
+            <a:off x="3377685" y="3085323"/>
+            <a:ext cx="727788" cy="373223"/>
+          </a:xfrm>
+          <a:prstGeom prst="rect">
+            <a:avLst/>
+          </a:prstGeom>
+        </p:spPr>
+        <p:style>
+          <a:lnRef idx="1">
+            <a:schemeClr val="accent2"/>
+          </a:lnRef>
+          <a:fillRef idx="2">
+            <a:schemeClr val="accent2"/>
+          </a:fillRef>
+          <a:effectRef idx="1">
+            <a:schemeClr val="accent2"/>
+          </a:effectRef>
+          <a:fontRef idx="minor">
+            <a:schemeClr val="dk1"/>
+          </a:fontRef>
+        </p:style>
+        <p:txBody>
+          <a:bodyPr rtlCol="0" anchor="ctr"/>
+          <a:lstStyle/>
+          <a:p>
+            <a:pPr algn="ctr"/>
+            <a:r>
+              <a:rPr lang="en-US" sz="1200" dirty="0" smtClean="0"/>
+              <a:t>4 - Apr</a:t>
+            </a:r>
+            <a:endParaRPr lang="en-US" sz="1200" dirty="0"/>
+          </a:p>
+        </p:txBody>
+      </p:sp>
+      <p:sp>
+        <p:nvSpPr>
+          <p:cNvPr id="35" name="Rectangle 34"/>
+          <p:cNvSpPr/>
+          <p:nvPr/>
+        </p:nvSpPr>
+        <p:spPr>
+          <a:xfrm>
+            <a:off x="4173898" y="3085323"/>
+            <a:ext cx="727788" cy="373223"/>
+          </a:xfrm>
+          <a:prstGeom prst="rect">
+            <a:avLst/>
+          </a:prstGeom>
+        </p:spPr>
+        <p:style>
+          <a:lnRef idx="1">
+            <a:schemeClr val="accent2"/>
+          </a:lnRef>
+          <a:fillRef idx="2">
+            <a:schemeClr val="accent2"/>
+          </a:fillRef>
+          <a:effectRef idx="1">
+            <a:schemeClr val="accent2"/>
+          </a:effectRef>
+          <a:fontRef idx="minor">
+            <a:schemeClr val="dk1"/>
+          </a:fontRef>
+        </p:style>
+        <p:txBody>
+          <a:bodyPr rtlCol="0" anchor="ctr"/>
+          <a:lstStyle/>
+          <a:p>
+            <a:pPr algn="ctr"/>
+            <a:r>
+              <a:rPr lang="en-US" sz="1200" dirty="0"/>
+              <a:t>5</a:t>
+            </a:r>
+            <a:r>
+              <a:rPr lang="en-US" sz="1200" dirty="0" smtClean="0"/>
+              <a:t> - May</a:t>
+            </a:r>
+            <a:endParaRPr lang="en-US" sz="1200" dirty="0"/>
+          </a:p>
+        </p:txBody>
+      </p:sp>
+      <p:sp>
+        <p:nvSpPr>
+          <p:cNvPr id="36" name="Rectangle 35"/>
+          <p:cNvSpPr/>
+          <p:nvPr/>
+        </p:nvSpPr>
+        <p:spPr>
+          <a:xfrm>
+            <a:off x="4970111" y="3085323"/>
+            <a:ext cx="727788" cy="373223"/>
+          </a:xfrm>
+          <a:prstGeom prst="rect">
+            <a:avLst/>
+          </a:prstGeom>
+        </p:spPr>
+        <p:style>
+          <a:lnRef idx="1">
+            <a:schemeClr val="accent2"/>
+          </a:lnRef>
+          <a:fillRef idx="2">
+            <a:schemeClr val="accent2"/>
+          </a:fillRef>
+          <a:effectRef idx="1">
+            <a:schemeClr val="accent2"/>
+          </a:effectRef>
+          <a:fontRef idx="minor">
+            <a:schemeClr val="dk1"/>
+          </a:fontRef>
+        </p:style>
+        <p:txBody>
+          <a:bodyPr rtlCol="0" anchor="ctr"/>
+          <a:lstStyle/>
+          <a:p>
+            <a:pPr algn="ctr"/>
+            <a:r>
+              <a:rPr lang="en-US" sz="1200" dirty="0" smtClean="0"/>
+              <a:t>6 - Jun</a:t>
+            </a:r>
+            <a:endParaRPr lang="en-US" sz="1200" dirty="0"/>
+          </a:p>
+        </p:txBody>
+      </p:sp>
+      <p:sp>
+        <p:nvSpPr>
+          <p:cNvPr id="37" name="Rectangle 36"/>
+          <p:cNvSpPr/>
+          <p:nvPr/>
+        </p:nvSpPr>
+        <p:spPr>
+          <a:xfrm>
+            <a:off x="5766324" y="3085323"/>
+            <a:ext cx="727788" cy="373223"/>
+          </a:xfrm>
+          <a:prstGeom prst="rect">
+            <a:avLst/>
+          </a:prstGeom>
+        </p:spPr>
+        <p:style>
+          <a:lnRef idx="1">
+            <a:schemeClr val="accent4"/>
+          </a:lnRef>
+          <a:fillRef idx="2">
+            <a:schemeClr val="accent4"/>
+          </a:fillRef>
+          <a:effectRef idx="1">
+            <a:schemeClr val="accent4"/>
+          </a:effectRef>
+          <a:fontRef idx="minor">
+            <a:schemeClr val="dk1"/>
+          </a:fontRef>
+        </p:style>
+        <p:txBody>
+          <a:bodyPr rtlCol="0" anchor="ctr"/>
+          <a:lstStyle/>
+          <a:p>
+            <a:pPr algn="ctr"/>
+            <a:r>
+              <a:rPr lang="en-US" sz="1200" dirty="0" smtClean="0"/>
+              <a:t>7 - Jul</a:t>
+            </a:r>
+            <a:endParaRPr lang="en-US" sz="1200" dirty="0"/>
+          </a:p>
+        </p:txBody>
+      </p:sp>
+      <p:sp>
+        <p:nvSpPr>
+          <p:cNvPr id="38" name="Rectangle 37"/>
+          <p:cNvSpPr/>
+          <p:nvPr/>
+        </p:nvSpPr>
+        <p:spPr>
+          <a:xfrm>
+            <a:off x="6562537" y="3085322"/>
+            <a:ext cx="727788" cy="373223"/>
+          </a:xfrm>
+          <a:prstGeom prst="rect">
+            <a:avLst/>
+          </a:prstGeom>
+        </p:spPr>
+        <p:style>
+          <a:lnRef idx="1">
+            <a:schemeClr val="accent4"/>
+          </a:lnRef>
+          <a:fillRef idx="2">
+            <a:schemeClr val="accent4"/>
+          </a:fillRef>
+          <a:effectRef idx="1">
+            <a:schemeClr val="accent4"/>
+          </a:effectRef>
+          <a:fontRef idx="minor">
+            <a:schemeClr val="dk1"/>
+          </a:fontRef>
+        </p:style>
+        <p:txBody>
+          <a:bodyPr rtlCol="0" anchor="ctr"/>
+          <a:lstStyle/>
+          <a:p>
+            <a:pPr algn="ctr"/>
+            <a:r>
+              <a:rPr lang="en-US" sz="1200" dirty="0"/>
+              <a:t>8</a:t>
+            </a:r>
+            <a:r>
+              <a:rPr lang="en-US" sz="1200" dirty="0" smtClean="0"/>
+              <a:t> - Aug</a:t>
+            </a:r>
+            <a:endParaRPr lang="en-US" sz="1200" dirty="0"/>
+          </a:p>
+        </p:txBody>
+      </p:sp>
+      <p:sp>
+        <p:nvSpPr>
+          <p:cNvPr id="39" name="Rectangle 38"/>
+          <p:cNvSpPr/>
+          <p:nvPr/>
+        </p:nvSpPr>
+        <p:spPr>
+          <a:xfrm>
+            <a:off x="7358750" y="3085322"/>
+            <a:ext cx="727788" cy="373223"/>
+          </a:xfrm>
+          <a:prstGeom prst="rect">
+            <a:avLst/>
+          </a:prstGeom>
+        </p:spPr>
+        <p:style>
+          <a:lnRef idx="1">
+            <a:schemeClr val="accent4"/>
+          </a:lnRef>
+          <a:fillRef idx="2">
+            <a:schemeClr val="accent4"/>
+          </a:fillRef>
+          <a:effectRef idx="1">
+            <a:schemeClr val="accent4"/>
+          </a:effectRef>
+          <a:fontRef idx="minor">
+            <a:schemeClr val="dk1"/>
+          </a:fontRef>
+        </p:style>
+        <p:txBody>
+          <a:bodyPr rtlCol="0" anchor="ctr"/>
+          <a:lstStyle/>
+          <a:p>
+            <a:pPr algn="ctr"/>
+            <a:r>
+              <a:rPr lang="en-US" sz="1200" dirty="0"/>
+              <a:t>9</a:t>
+            </a:r>
+            <a:r>
+              <a:rPr lang="en-US" sz="1200" dirty="0" smtClean="0"/>
+              <a:t> - Sep</a:t>
+            </a:r>
+            <a:endParaRPr lang="en-US" sz="1200" dirty="0"/>
+          </a:p>
+        </p:txBody>
+      </p:sp>
+      <p:sp>
+        <p:nvSpPr>
+          <p:cNvPr id="40" name="Rectangle 39"/>
+          <p:cNvSpPr/>
+          <p:nvPr/>
+        </p:nvSpPr>
+        <p:spPr>
+          <a:xfrm>
+            <a:off x="8154963" y="3085321"/>
+            <a:ext cx="727788" cy="373223"/>
+          </a:xfrm>
+          <a:prstGeom prst="rect">
+            <a:avLst/>
+          </a:prstGeom>
+        </p:spPr>
+        <p:style>
+          <a:lnRef idx="1">
+            <a:schemeClr val="accent6"/>
+          </a:lnRef>
+          <a:fillRef idx="2">
+            <a:schemeClr val="accent6"/>
+          </a:fillRef>
+          <a:effectRef idx="1">
+            <a:schemeClr val="accent6"/>
+          </a:effectRef>
+          <a:fontRef idx="minor">
+            <a:schemeClr val="dk1"/>
+          </a:fontRef>
+        </p:style>
+        <p:txBody>
+          <a:bodyPr rtlCol="0" anchor="ctr"/>
+          <a:lstStyle/>
+          <a:p>
+            <a:pPr algn="ctr"/>
+            <a:r>
+              <a:rPr lang="en-US" sz="1200" dirty="0" smtClean="0"/>
+              <a:t>10 - Oct</a:t>
+            </a:r>
+            <a:endParaRPr lang="en-US" sz="1200" dirty="0"/>
+          </a:p>
+        </p:txBody>
+      </p:sp>
+      <p:sp>
+        <p:nvSpPr>
+          <p:cNvPr id="41" name="Rectangle 40"/>
+          <p:cNvSpPr/>
+          <p:nvPr/>
+        </p:nvSpPr>
+        <p:spPr>
+          <a:xfrm>
+            <a:off x="8951176" y="3085322"/>
+            <a:ext cx="727788" cy="373223"/>
+          </a:xfrm>
+          <a:prstGeom prst="rect">
+            <a:avLst/>
+          </a:prstGeom>
+        </p:spPr>
+        <p:style>
+          <a:lnRef idx="1">
+            <a:schemeClr val="accent6"/>
+          </a:lnRef>
+          <a:fillRef idx="2">
+            <a:schemeClr val="accent6"/>
+          </a:fillRef>
+          <a:effectRef idx="1">
+            <a:schemeClr val="accent6"/>
+          </a:effectRef>
+          <a:fontRef idx="minor">
+            <a:schemeClr val="dk1"/>
+          </a:fontRef>
+        </p:style>
+        <p:txBody>
+          <a:bodyPr rtlCol="0" anchor="ctr"/>
+          <a:lstStyle/>
+          <a:p>
+            <a:pPr algn="ctr"/>
+            <a:r>
+              <a:rPr lang="en-US" sz="1200" dirty="0" smtClean="0"/>
+              <a:t>11 - Nov</a:t>
+            </a:r>
+            <a:endParaRPr lang="en-US" sz="1200" dirty="0"/>
+          </a:p>
+        </p:txBody>
+      </p:sp>
+      <p:sp>
+        <p:nvSpPr>
+          <p:cNvPr id="42" name="Rectangle 41"/>
+          <p:cNvSpPr/>
+          <p:nvPr/>
+        </p:nvSpPr>
+        <p:spPr>
+          <a:xfrm>
+            <a:off x="9747389" y="3085321"/>
+            <a:ext cx="727788" cy="373223"/>
+          </a:xfrm>
+          <a:prstGeom prst="rect">
+            <a:avLst/>
+          </a:prstGeom>
+        </p:spPr>
+        <p:style>
+          <a:lnRef idx="1">
+            <a:schemeClr val="accent6"/>
+          </a:lnRef>
+          <a:fillRef idx="2">
+            <a:schemeClr val="accent6"/>
+          </a:fillRef>
+          <a:effectRef idx="1">
+            <a:schemeClr val="accent6"/>
+          </a:effectRef>
+          <a:fontRef idx="minor">
+            <a:schemeClr val="dk1"/>
+          </a:fontRef>
+        </p:style>
+        <p:txBody>
+          <a:bodyPr rtlCol="0" anchor="ctr"/>
+          <a:lstStyle/>
+          <a:p>
+            <a:pPr algn="ctr"/>
+            <a:r>
+              <a:rPr lang="en-US" sz="1200" dirty="0" smtClean="0"/>
+              <a:t>12 - Dec</a:t>
+            </a:r>
+            <a:endParaRPr lang="en-US" sz="1200" dirty="0"/>
+          </a:p>
+        </p:txBody>
+      </p:sp>
+      <p:sp>
+        <p:nvSpPr>
+          <p:cNvPr id="44" name="Rectangle 43"/>
+          <p:cNvSpPr/>
+          <p:nvPr/>
+        </p:nvSpPr>
+        <p:spPr>
+          <a:xfrm>
+            <a:off x="989046" y="3993502"/>
+            <a:ext cx="727788" cy="373223"/>
+          </a:xfrm>
+          <a:prstGeom prst="rect">
+            <a:avLst/>
+          </a:prstGeom>
+        </p:spPr>
+        <p:style>
+          <a:lnRef idx="1">
+            <a:schemeClr val="accent1"/>
+          </a:lnRef>
+          <a:fillRef idx="2">
+            <a:schemeClr val="accent1"/>
+          </a:fillRef>
+          <a:effectRef idx="1">
+            <a:schemeClr val="accent1"/>
+          </a:effectRef>
+          <a:fontRef idx="minor">
+            <a:schemeClr val="dk1"/>
+          </a:fontRef>
+        </p:style>
+        <p:txBody>
+          <a:bodyPr rtlCol="0" anchor="ctr"/>
+          <a:lstStyle/>
+          <a:p>
+            <a:pPr algn="ctr"/>
+            <a:r>
+              <a:rPr lang="en-US" sz="1200" dirty="0" smtClean="0"/>
+              <a:t>1 - Jan</a:t>
+            </a:r>
+            <a:endParaRPr lang="en-US" sz="1200" dirty="0"/>
+          </a:p>
+        </p:txBody>
+      </p:sp>
+      <p:sp>
+        <p:nvSpPr>
+          <p:cNvPr id="45" name="Rectangle 44"/>
+          <p:cNvSpPr/>
+          <p:nvPr/>
+        </p:nvSpPr>
+        <p:spPr>
+          <a:xfrm>
+            <a:off x="1785259" y="3993502"/>
+            <a:ext cx="727788" cy="373223"/>
+          </a:xfrm>
+          <a:prstGeom prst="rect">
+            <a:avLst/>
+          </a:prstGeom>
+        </p:spPr>
+        <p:style>
+          <a:lnRef idx="1">
+            <a:schemeClr val="accent1"/>
+          </a:lnRef>
+          <a:fillRef idx="2">
+            <a:schemeClr val="accent1"/>
+          </a:fillRef>
+          <a:effectRef idx="1">
+            <a:schemeClr val="accent1"/>
+          </a:effectRef>
+          <a:fontRef idx="minor">
+            <a:schemeClr val="dk1"/>
+          </a:fontRef>
+        </p:style>
+        <p:txBody>
+          <a:bodyPr rtlCol="0" anchor="ctr"/>
+          <a:lstStyle/>
+          <a:p>
+            <a:pPr algn="ctr"/>
+            <a:r>
+              <a:rPr lang="en-US" sz="1200" dirty="0"/>
+              <a:t>2</a:t>
+            </a:r>
+            <a:r>
+              <a:rPr lang="en-US" sz="1200" dirty="0" smtClean="0"/>
+              <a:t> - Feb</a:t>
+            </a:r>
+            <a:endParaRPr lang="en-US" sz="1200" dirty="0"/>
+          </a:p>
+        </p:txBody>
+      </p:sp>
+      <p:sp>
+        <p:nvSpPr>
+          <p:cNvPr id="46" name="Rectangle 45"/>
+          <p:cNvSpPr/>
+          <p:nvPr/>
+        </p:nvSpPr>
+        <p:spPr>
+          <a:xfrm>
+            <a:off x="2581472" y="3993502"/>
+            <a:ext cx="727788" cy="373223"/>
+          </a:xfrm>
+          <a:prstGeom prst="rect">
+            <a:avLst/>
+          </a:prstGeom>
+        </p:spPr>
+        <p:style>
+          <a:lnRef idx="1">
+            <a:schemeClr val="accent1"/>
+          </a:lnRef>
+          <a:fillRef idx="2">
+            <a:schemeClr val="accent1"/>
+          </a:fillRef>
+          <a:effectRef idx="1">
+            <a:schemeClr val="accent1"/>
+          </a:effectRef>
+          <a:fontRef idx="minor">
+            <a:schemeClr val="dk1"/>
+          </a:fontRef>
+        </p:style>
+        <p:txBody>
+          <a:bodyPr rtlCol="0" anchor="ctr"/>
+          <a:lstStyle/>
+          <a:p>
+            <a:pPr algn="ctr"/>
+            <a:r>
+              <a:rPr lang="en-US" sz="1200" dirty="0" smtClean="0"/>
+              <a:t>3 - Mar</a:t>
+            </a:r>
+            <a:endParaRPr lang="en-US" sz="1200" dirty="0"/>
+          </a:p>
+        </p:txBody>
+      </p:sp>
+      <p:sp>
+        <p:nvSpPr>
+          <p:cNvPr id="47" name="Rectangle 46"/>
+          <p:cNvSpPr/>
+          <p:nvPr/>
+        </p:nvSpPr>
+        <p:spPr>
+          <a:xfrm>
+            <a:off x="3377685" y="3993502"/>
+            <a:ext cx="727788" cy="373223"/>
+          </a:xfrm>
+          <a:prstGeom prst="rect">
+            <a:avLst/>
+          </a:prstGeom>
+        </p:spPr>
+        <p:style>
+          <a:lnRef idx="1">
+            <a:schemeClr val="accent2"/>
+          </a:lnRef>
+          <a:fillRef idx="2">
+            <a:schemeClr val="accent2"/>
+          </a:fillRef>
+          <a:effectRef idx="1">
+            <a:schemeClr val="accent2"/>
+          </a:effectRef>
+          <a:fontRef idx="minor">
+            <a:schemeClr val="dk1"/>
+          </a:fontRef>
+        </p:style>
+        <p:txBody>
+          <a:bodyPr rtlCol="0" anchor="ctr"/>
+          <a:lstStyle/>
+          <a:p>
+            <a:pPr algn="ctr"/>
+            <a:r>
+              <a:rPr lang="en-US" sz="1200" dirty="0" smtClean="0"/>
+              <a:t>4 - Apr</a:t>
+            </a:r>
+            <a:endParaRPr lang="en-US" sz="1200" dirty="0"/>
+          </a:p>
+        </p:txBody>
+      </p:sp>
+      <p:sp>
+        <p:nvSpPr>
+          <p:cNvPr id="48" name="Rectangle 47"/>
+          <p:cNvSpPr/>
+          <p:nvPr/>
+        </p:nvSpPr>
+        <p:spPr>
+          <a:xfrm>
+            <a:off x="4173898" y="3993502"/>
+            <a:ext cx="727788" cy="373223"/>
+          </a:xfrm>
+          <a:prstGeom prst="rect">
+            <a:avLst/>
+          </a:prstGeom>
+        </p:spPr>
+        <p:style>
+          <a:lnRef idx="1">
+            <a:schemeClr val="accent2"/>
+          </a:lnRef>
+          <a:fillRef idx="2">
+            <a:schemeClr val="accent2"/>
+          </a:fillRef>
+          <a:effectRef idx="1">
+            <a:schemeClr val="accent2"/>
+          </a:effectRef>
+          <a:fontRef idx="minor">
+            <a:schemeClr val="dk1"/>
+          </a:fontRef>
+        </p:style>
+        <p:txBody>
+          <a:bodyPr rtlCol="0" anchor="ctr"/>
+          <a:lstStyle/>
+          <a:p>
+            <a:pPr algn="ctr"/>
+            <a:r>
+              <a:rPr lang="en-US" sz="1200" dirty="0"/>
+              <a:t>5</a:t>
+            </a:r>
+            <a:r>
+              <a:rPr lang="en-US" sz="1200" dirty="0" smtClean="0"/>
+              <a:t> - May</a:t>
+            </a:r>
+            <a:endParaRPr lang="en-US" sz="1200" dirty="0"/>
+          </a:p>
+        </p:txBody>
+      </p:sp>
+      <p:sp>
+        <p:nvSpPr>
+          <p:cNvPr id="49" name="Rectangle 48"/>
+          <p:cNvSpPr/>
+          <p:nvPr/>
+        </p:nvSpPr>
+        <p:spPr>
+          <a:xfrm>
+            <a:off x="4970111" y="3993502"/>
+            <a:ext cx="727788" cy="373223"/>
+          </a:xfrm>
+          <a:prstGeom prst="rect">
+            <a:avLst/>
+          </a:prstGeom>
+        </p:spPr>
+        <p:style>
+          <a:lnRef idx="1">
+            <a:schemeClr val="accent2"/>
+          </a:lnRef>
+          <a:fillRef idx="2">
+            <a:schemeClr val="accent2"/>
+          </a:fillRef>
+          <a:effectRef idx="1">
+            <a:schemeClr val="accent2"/>
+          </a:effectRef>
+          <a:fontRef idx="minor">
+            <a:schemeClr val="dk1"/>
+          </a:fontRef>
+        </p:style>
+        <p:txBody>
+          <a:bodyPr rtlCol="0" anchor="ctr"/>
+          <a:lstStyle/>
+          <a:p>
+            <a:pPr algn="ctr"/>
+            <a:r>
+              <a:rPr lang="en-US" sz="1200" dirty="0" smtClean="0"/>
+              <a:t>6 - Jun</a:t>
+            </a:r>
+            <a:endParaRPr lang="en-US" sz="1200" dirty="0"/>
+          </a:p>
+        </p:txBody>
+      </p:sp>
+      <p:sp>
+        <p:nvSpPr>
+          <p:cNvPr id="50" name="Rectangle 49"/>
+          <p:cNvSpPr/>
+          <p:nvPr/>
+        </p:nvSpPr>
+        <p:spPr>
+          <a:xfrm>
+            <a:off x="5766324" y="3993502"/>
+            <a:ext cx="727788" cy="373223"/>
+          </a:xfrm>
+          <a:prstGeom prst="rect">
+            <a:avLst/>
+          </a:prstGeom>
+        </p:spPr>
+        <p:style>
+          <a:lnRef idx="1">
+            <a:schemeClr val="accent4"/>
+          </a:lnRef>
+          <a:fillRef idx="2">
+            <a:schemeClr val="accent4"/>
+          </a:fillRef>
+          <a:effectRef idx="1">
+            <a:schemeClr val="accent4"/>
+          </a:effectRef>
+          <a:fontRef idx="minor">
+            <a:schemeClr val="dk1"/>
+          </a:fontRef>
+        </p:style>
+        <p:txBody>
+          <a:bodyPr rtlCol="0" anchor="ctr"/>
+          <a:lstStyle/>
+          <a:p>
+            <a:pPr algn="ctr"/>
+            <a:r>
+              <a:rPr lang="en-US" sz="1200" dirty="0" smtClean="0"/>
+              <a:t>7 - Jul</a:t>
+            </a:r>
+            <a:endParaRPr lang="en-US" sz="1200" dirty="0"/>
+          </a:p>
+        </p:txBody>
+      </p:sp>
+      <p:sp>
+        <p:nvSpPr>
+          <p:cNvPr id="51" name="Rectangle 50"/>
+          <p:cNvSpPr/>
+          <p:nvPr/>
+        </p:nvSpPr>
+        <p:spPr>
+          <a:xfrm>
+            <a:off x="6562537" y="3993501"/>
+            <a:ext cx="727788" cy="373223"/>
+          </a:xfrm>
+          <a:prstGeom prst="rect">
+            <a:avLst/>
+          </a:prstGeom>
+        </p:spPr>
+        <p:style>
+          <a:lnRef idx="1">
+            <a:schemeClr val="accent4"/>
+          </a:lnRef>
+          <a:fillRef idx="2">
+            <a:schemeClr val="accent4"/>
+          </a:fillRef>
+          <a:effectRef idx="1">
+            <a:schemeClr val="accent4"/>
+          </a:effectRef>
+          <a:fontRef idx="minor">
+            <a:schemeClr val="dk1"/>
+          </a:fontRef>
+        </p:style>
+        <p:txBody>
+          <a:bodyPr rtlCol="0" anchor="ctr"/>
+          <a:lstStyle/>
+          <a:p>
+            <a:pPr algn="ctr"/>
+            <a:r>
+              <a:rPr lang="en-US" sz="1200" dirty="0"/>
+              <a:t>8</a:t>
+            </a:r>
+            <a:r>
+              <a:rPr lang="en-US" sz="1200" dirty="0" smtClean="0"/>
+              <a:t> - Aug</a:t>
+            </a:r>
+            <a:endParaRPr lang="en-US" sz="1200" dirty="0"/>
+          </a:p>
+        </p:txBody>
+      </p:sp>
+      <p:sp>
+        <p:nvSpPr>
+          <p:cNvPr id="52" name="Rectangle 51"/>
+          <p:cNvSpPr/>
+          <p:nvPr/>
+        </p:nvSpPr>
+        <p:spPr>
+          <a:xfrm>
+            <a:off x="7358750" y="3993501"/>
+            <a:ext cx="727788" cy="373223"/>
+          </a:xfrm>
+          <a:prstGeom prst="rect">
+            <a:avLst/>
+          </a:prstGeom>
+        </p:spPr>
+        <p:style>
+          <a:lnRef idx="1">
+            <a:schemeClr val="accent4"/>
+          </a:lnRef>
+          <a:fillRef idx="2">
+            <a:schemeClr val="accent4"/>
+          </a:fillRef>
+          <a:effectRef idx="1">
+            <a:schemeClr val="accent4"/>
+          </a:effectRef>
+          <a:fontRef idx="minor">
+            <a:schemeClr val="dk1"/>
+          </a:fontRef>
+        </p:style>
+        <p:txBody>
+          <a:bodyPr rtlCol="0" anchor="ctr"/>
+          <a:lstStyle/>
+          <a:p>
+            <a:pPr algn="ctr"/>
+            <a:r>
+              <a:rPr lang="en-US" sz="1200" dirty="0"/>
+              <a:t>9</a:t>
+            </a:r>
+            <a:r>
+              <a:rPr lang="en-US" sz="1200" dirty="0" smtClean="0"/>
+              <a:t> - Sep</a:t>
+            </a:r>
+            <a:endParaRPr lang="en-US" sz="1200" dirty="0"/>
+          </a:p>
+        </p:txBody>
+      </p:sp>
+      <p:sp>
+        <p:nvSpPr>
+          <p:cNvPr id="53" name="Rectangle 52"/>
+          <p:cNvSpPr/>
+          <p:nvPr/>
+        </p:nvSpPr>
+        <p:spPr>
+          <a:xfrm>
+            <a:off x="8154963" y="3993500"/>
+            <a:ext cx="727788" cy="373223"/>
+          </a:xfrm>
+          <a:prstGeom prst="rect">
+            <a:avLst/>
+          </a:prstGeom>
+        </p:spPr>
+        <p:style>
+          <a:lnRef idx="1">
+            <a:schemeClr val="accent6"/>
+          </a:lnRef>
+          <a:fillRef idx="2">
+            <a:schemeClr val="accent6"/>
+          </a:fillRef>
+          <a:effectRef idx="1">
+            <a:schemeClr val="accent6"/>
+          </a:effectRef>
+          <a:fontRef idx="minor">
+            <a:schemeClr val="dk1"/>
+          </a:fontRef>
+        </p:style>
+        <p:txBody>
+          <a:bodyPr rtlCol="0" anchor="ctr"/>
+          <a:lstStyle/>
+          <a:p>
+            <a:pPr algn="ctr"/>
+            <a:r>
+              <a:rPr lang="en-US" sz="1200" dirty="0" smtClean="0"/>
+              <a:t>10 - Oct</a:t>
+            </a:r>
+            <a:endParaRPr lang="en-US" sz="1200" dirty="0"/>
+          </a:p>
+        </p:txBody>
+      </p:sp>
+      <p:sp>
+        <p:nvSpPr>
+          <p:cNvPr id="54" name="Rectangle 53"/>
+          <p:cNvSpPr/>
+          <p:nvPr/>
+        </p:nvSpPr>
+        <p:spPr>
+          <a:xfrm>
+            <a:off x="8951176" y="3993501"/>
+            <a:ext cx="727788" cy="373223"/>
+          </a:xfrm>
+          <a:prstGeom prst="rect">
+            <a:avLst/>
+          </a:prstGeom>
+        </p:spPr>
+        <p:style>
+          <a:lnRef idx="1">
+            <a:schemeClr val="accent6"/>
+          </a:lnRef>
+          <a:fillRef idx="2">
+            <a:schemeClr val="accent6"/>
+          </a:fillRef>
+          <a:effectRef idx="1">
+            <a:schemeClr val="accent6"/>
+          </a:effectRef>
+          <a:fontRef idx="minor">
+            <a:schemeClr val="dk1"/>
+          </a:fontRef>
+        </p:style>
+        <p:txBody>
+          <a:bodyPr rtlCol="0" anchor="ctr"/>
+          <a:lstStyle/>
+          <a:p>
+            <a:pPr algn="ctr"/>
+            <a:r>
+              <a:rPr lang="en-US" sz="1200" dirty="0" smtClean="0"/>
+              <a:t>11 - Nov</a:t>
+            </a:r>
+            <a:endParaRPr lang="en-US" sz="1200" dirty="0"/>
+          </a:p>
+        </p:txBody>
+      </p:sp>
+      <p:sp>
+        <p:nvSpPr>
+          <p:cNvPr id="55" name="Rectangle 54"/>
+          <p:cNvSpPr/>
+          <p:nvPr/>
+        </p:nvSpPr>
+        <p:spPr>
+          <a:xfrm>
+            <a:off x="9747389" y="3993500"/>
+            <a:ext cx="727788" cy="373223"/>
+          </a:xfrm>
+          <a:prstGeom prst="rect">
+            <a:avLst/>
+          </a:prstGeom>
+        </p:spPr>
+        <p:style>
+          <a:lnRef idx="1">
+            <a:schemeClr val="accent6"/>
+          </a:lnRef>
+          <a:fillRef idx="2">
+            <a:schemeClr val="accent6"/>
+          </a:fillRef>
+          <a:effectRef idx="1">
+            <a:schemeClr val="accent6"/>
+          </a:effectRef>
+          <a:fontRef idx="minor">
+            <a:schemeClr val="dk1"/>
+          </a:fontRef>
+        </p:style>
+        <p:txBody>
+          <a:bodyPr rtlCol="0" anchor="ctr"/>
+          <a:lstStyle/>
+          <a:p>
+            <a:pPr algn="ctr"/>
+            <a:r>
+              <a:rPr lang="en-US" sz="1200" dirty="0" smtClean="0"/>
+              <a:t>12 - Dec</a:t>
+            </a:r>
+            <a:endParaRPr lang="en-US" sz="1200" dirty="0"/>
+          </a:p>
+        </p:txBody>
+      </p:sp>
+      <p:sp>
+        <p:nvSpPr>
+          <p:cNvPr id="43" name="Rectangle 42"/>
+          <p:cNvSpPr/>
+          <p:nvPr/>
+        </p:nvSpPr>
+        <p:spPr>
+          <a:xfrm>
+            <a:off x="783771" y="3685591"/>
+            <a:ext cx="9769151" cy="765109"/>
+          </a:xfrm>
+          <a:prstGeom prst="rect">
+            <a:avLst/>
+          </a:prstGeom>
+          <a:solidFill>
+            <a:schemeClr val="bg1">
+              <a:alpha val="60000"/>
+            </a:schemeClr>
+          </a:solidFill>
+          <a:ln w="9525" cap="flat" cmpd="sng" algn="ctr">
+            <a:solidFill>
+              <a:schemeClr val="dk1"/>
+            </a:solidFill>
+            <a:prstDash val="solid"/>
+            <a:round/>
+            <a:headEnd type="none" w="med" len="med"/>
+            <a:tailEnd type="none" w="med" len="med"/>
+          </a:ln>
+        </p:spPr>
+        <p:style>
+          <a:lnRef idx="0">
+            <a:scrgbClr r="0" g="0" b="0"/>
+          </a:lnRef>
+          <a:fillRef idx="0">
+            <a:scrgbClr r="0" g="0" b="0"/>
+          </a:fillRef>
+          <a:effectRef idx="0">
+            <a:scrgbClr r="0" g="0" b="0"/>
+          </a:effectRef>
+          <a:fontRef idx="minor">
+            <a:schemeClr val="dk1"/>
+          </a:fontRef>
+        </p:style>
+        <p:txBody>
+          <a:bodyPr rtlCol="0" anchor="t"/>
+          <a:lstStyle/>
+          <a:p>
+            <a:r>
+              <a:rPr lang="en-US" sz="1400" dirty="0" smtClean="0"/>
+              <a:t>2012</a:t>
+            </a:r>
+            <a:endParaRPr lang="en-US" sz="1400" dirty="0"/>
+          </a:p>
+        </p:txBody>
+      </p:sp>
+      <p:sp>
+        <p:nvSpPr>
+          <p:cNvPr id="30" name="Rectangle 29"/>
+          <p:cNvSpPr/>
+          <p:nvPr/>
+        </p:nvSpPr>
+        <p:spPr>
+          <a:xfrm>
+            <a:off x="783771" y="2777412"/>
+            <a:ext cx="9769151" cy="765109"/>
+          </a:xfrm>
+          <a:prstGeom prst="rect">
+            <a:avLst/>
+          </a:prstGeom>
+          <a:solidFill>
+            <a:schemeClr val="bg1">
+              <a:alpha val="40000"/>
+            </a:schemeClr>
+          </a:solidFill>
+          <a:ln w="9525" cap="flat" cmpd="sng" algn="ctr">
+            <a:solidFill>
+              <a:schemeClr val="dk1"/>
+            </a:solidFill>
+            <a:prstDash val="solid"/>
+            <a:round/>
+            <a:headEnd type="none" w="med" len="med"/>
+            <a:tailEnd type="none" w="med" len="med"/>
+          </a:ln>
+        </p:spPr>
+        <p:style>
+          <a:lnRef idx="0">
+            <a:scrgbClr r="0" g="0" b="0"/>
+          </a:lnRef>
+          <a:fillRef idx="0">
+            <a:scrgbClr r="0" g="0" b="0"/>
+          </a:fillRef>
+          <a:effectRef idx="0">
+            <a:scrgbClr r="0" g="0" b="0"/>
+          </a:effectRef>
+          <a:fontRef idx="minor">
+            <a:schemeClr val="dk1"/>
+          </a:fontRef>
+        </p:style>
+        <p:txBody>
+          <a:bodyPr rtlCol="0" anchor="t"/>
+          <a:lstStyle/>
+          <a:p>
+            <a:r>
+              <a:rPr lang="en-US" sz="1400" dirty="0" smtClean="0"/>
+              <a:t>2013</a:t>
+            </a:r>
+            <a:endParaRPr lang="en-US" sz="1400" dirty="0"/>
+          </a:p>
+        </p:txBody>
+      </p:sp>
+      <p:sp>
+        <p:nvSpPr>
+          <p:cNvPr id="17" name="Rectangle 16"/>
+          <p:cNvSpPr/>
+          <p:nvPr/>
+        </p:nvSpPr>
+        <p:spPr>
+          <a:xfrm>
+            <a:off x="783771" y="1869233"/>
+            <a:ext cx="9769151" cy="765109"/>
+          </a:xfrm>
+          <a:prstGeom prst="rect">
+            <a:avLst/>
+          </a:prstGeom>
+          <a:solidFill>
+            <a:schemeClr val="bg1">
+              <a:alpha val="20000"/>
+            </a:schemeClr>
+          </a:solidFill>
+          <a:ln w="9525" cap="flat" cmpd="sng" algn="ctr">
+            <a:solidFill>
+              <a:schemeClr val="dk1"/>
+            </a:solidFill>
+            <a:prstDash val="solid"/>
+            <a:round/>
+            <a:headEnd type="none" w="med" len="med"/>
+            <a:tailEnd type="none" w="med" len="med"/>
+          </a:ln>
+        </p:spPr>
+        <p:style>
+          <a:lnRef idx="0">
+            <a:scrgbClr r="0" g="0" b="0"/>
+          </a:lnRef>
+          <a:fillRef idx="0">
+            <a:scrgbClr r="0" g="0" b="0"/>
+          </a:fillRef>
+          <a:effectRef idx="0">
+            <a:scrgbClr r="0" g="0" b="0"/>
+          </a:effectRef>
+          <a:fontRef idx="minor">
+            <a:schemeClr val="dk1"/>
+          </a:fontRef>
+        </p:style>
+        <p:txBody>
+          <a:bodyPr rtlCol="0" anchor="t"/>
+          <a:lstStyle/>
+          <a:p>
+            <a:r>
+              <a:rPr lang="en-US" sz="1400" dirty="0" smtClean="0"/>
+              <a:t>2014</a:t>
+            </a:r>
+            <a:endParaRPr lang="en-US" sz="1400" dirty="0"/>
+          </a:p>
+        </p:txBody>
+      </p:sp>
+      <p:sp>
+        <p:nvSpPr>
+          <p:cNvPr id="16" name="Rectangle 15"/>
+          <p:cNvSpPr/>
+          <p:nvPr/>
+        </p:nvSpPr>
+        <p:spPr>
+          <a:xfrm>
+            <a:off x="783771" y="961054"/>
+            <a:ext cx="9769151" cy="765109"/>
+          </a:xfrm>
+          <a:prstGeom prst="rect">
+            <a:avLst/>
+          </a:prstGeom>
+          <a:noFill/>
+          <a:ln w="9525" cap="flat" cmpd="sng" algn="ctr">
+            <a:solidFill>
+              <a:schemeClr val="dk1"/>
+            </a:solidFill>
+            <a:prstDash val="solid"/>
+            <a:round/>
+            <a:headEnd type="none" w="med" len="med"/>
+            <a:tailEnd type="none" w="med" len="med"/>
+          </a:ln>
+        </p:spPr>
+        <p:style>
+          <a:lnRef idx="0">
+            <a:scrgbClr r="0" g="0" b="0"/>
+          </a:lnRef>
+          <a:fillRef idx="0">
+            <a:scrgbClr r="0" g="0" b="0"/>
+          </a:fillRef>
+          <a:effectRef idx="0">
+            <a:scrgbClr r="0" g="0" b="0"/>
+          </a:effectRef>
+          <a:fontRef idx="minor">
+            <a:schemeClr val="dk1"/>
+          </a:fontRef>
+        </p:style>
+        <p:txBody>
+          <a:bodyPr rtlCol="0" anchor="t"/>
+          <a:lstStyle/>
+          <a:p>
+            <a:r>
+              <a:rPr lang="en-US" sz="1400" dirty="0" smtClean="0"/>
+              <a:t>2015</a:t>
+            </a:r>
+            <a:endParaRPr lang="en-US" sz="1400" dirty="0"/>
+          </a:p>
+        </p:txBody>
+      </p:sp>
+      <p:sp>
+        <p:nvSpPr>
+          <p:cNvPr id="56" name="Rectangle 55"/>
+          <p:cNvSpPr/>
+          <p:nvPr/>
+        </p:nvSpPr>
+        <p:spPr>
+          <a:xfrm>
+            <a:off x="989046" y="4886129"/>
+            <a:ext cx="727788" cy="373223"/>
+          </a:xfrm>
+          <a:prstGeom prst="rect">
+            <a:avLst/>
+          </a:prstGeom>
+        </p:spPr>
+        <p:style>
+          <a:lnRef idx="1">
+            <a:schemeClr val="accent1"/>
+          </a:lnRef>
+          <a:fillRef idx="2">
+            <a:schemeClr val="accent1"/>
+          </a:fillRef>
+          <a:effectRef idx="1">
+            <a:schemeClr val="accent1"/>
+          </a:effectRef>
+          <a:fontRef idx="minor">
+            <a:schemeClr val="dk1"/>
+          </a:fontRef>
+        </p:style>
+        <p:txBody>
+          <a:bodyPr rtlCol="0" anchor="ctr"/>
+          <a:lstStyle/>
+          <a:p>
+            <a:pPr algn="ctr"/>
+            <a:r>
+              <a:rPr lang="en-US" sz="1200" dirty="0" smtClean="0"/>
+              <a:t>1 - Jan</a:t>
+            </a:r>
+            <a:endParaRPr lang="en-US" sz="1200" dirty="0"/>
+          </a:p>
+        </p:txBody>
+      </p:sp>
+      <p:sp>
+        <p:nvSpPr>
+          <p:cNvPr id="57" name="Rectangle 56"/>
+          <p:cNvSpPr/>
+          <p:nvPr/>
+        </p:nvSpPr>
+        <p:spPr>
+          <a:xfrm>
+            <a:off x="1785259" y="4886129"/>
+            <a:ext cx="727788" cy="373223"/>
+          </a:xfrm>
+          <a:prstGeom prst="rect">
+            <a:avLst/>
+          </a:prstGeom>
+        </p:spPr>
+        <p:style>
+          <a:lnRef idx="1">
+            <a:schemeClr val="accent1"/>
+          </a:lnRef>
+          <a:fillRef idx="2">
+            <a:schemeClr val="accent1"/>
+          </a:fillRef>
+          <a:effectRef idx="1">
+            <a:schemeClr val="accent1"/>
+          </a:effectRef>
+          <a:fontRef idx="minor">
+            <a:schemeClr val="dk1"/>
+          </a:fontRef>
+        </p:style>
+        <p:txBody>
+          <a:bodyPr rtlCol="0" anchor="ctr"/>
+          <a:lstStyle/>
+          <a:p>
+            <a:pPr algn="ctr"/>
+            <a:r>
+              <a:rPr lang="en-US" sz="1200" dirty="0"/>
+              <a:t>2</a:t>
+            </a:r>
+            <a:r>
+              <a:rPr lang="en-US" sz="1200" dirty="0" smtClean="0"/>
+              <a:t> - Feb</a:t>
+            </a:r>
+            <a:endParaRPr lang="en-US" sz="1200" dirty="0"/>
+          </a:p>
+        </p:txBody>
+      </p:sp>
+      <p:sp>
+        <p:nvSpPr>
+          <p:cNvPr id="58" name="Rectangle 57"/>
+          <p:cNvSpPr/>
+          <p:nvPr/>
+        </p:nvSpPr>
+        <p:spPr>
+          <a:xfrm>
+            <a:off x="2581472" y="4886129"/>
+            <a:ext cx="727788" cy="373223"/>
+          </a:xfrm>
+          <a:prstGeom prst="rect">
+            <a:avLst/>
+          </a:prstGeom>
+        </p:spPr>
+        <p:style>
+          <a:lnRef idx="1">
+            <a:schemeClr val="accent1"/>
+          </a:lnRef>
+          <a:fillRef idx="2">
+            <a:schemeClr val="accent1"/>
+          </a:fillRef>
+          <a:effectRef idx="1">
+            <a:schemeClr val="accent1"/>
+          </a:effectRef>
+          <a:fontRef idx="minor">
+            <a:schemeClr val="dk1"/>
+          </a:fontRef>
+        </p:style>
+        <p:txBody>
+          <a:bodyPr rtlCol="0" anchor="ctr"/>
+          <a:lstStyle/>
+          <a:p>
+            <a:pPr algn="ctr"/>
+            <a:r>
+              <a:rPr lang="en-US" sz="1200" dirty="0" smtClean="0"/>
+              <a:t>3 - Mar</a:t>
+            </a:r>
+            <a:endParaRPr lang="en-US" sz="1200" dirty="0"/>
+          </a:p>
+        </p:txBody>
+      </p:sp>
+      <p:sp>
+        <p:nvSpPr>
+          <p:cNvPr id="59" name="Rectangle 58"/>
+          <p:cNvSpPr/>
+          <p:nvPr/>
+        </p:nvSpPr>
+        <p:spPr>
+          <a:xfrm>
+            <a:off x="3377685" y="4886129"/>
+            <a:ext cx="727788" cy="373223"/>
+          </a:xfrm>
+          <a:prstGeom prst="rect">
+            <a:avLst/>
+          </a:prstGeom>
+        </p:spPr>
+        <p:style>
+          <a:lnRef idx="1">
+            <a:schemeClr val="accent2"/>
+          </a:lnRef>
+          <a:fillRef idx="2">
+            <a:schemeClr val="accent2"/>
+          </a:fillRef>
+          <a:effectRef idx="1">
+            <a:schemeClr val="accent2"/>
+          </a:effectRef>
+          <a:fontRef idx="minor">
+            <a:schemeClr val="dk1"/>
+          </a:fontRef>
+        </p:style>
+        <p:txBody>
+          <a:bodyPr rtlCol="0" anchor="ctr"/>
+          <a:lstStyle/>
+          <a:p>
+            <a:pPr algn="ctr"/>
+            <a:r>
+              <a:rPr lang="en-US" sz="1200" dirty="0" smtClean="0"/>
+              <a:t>4 - Apr</a:t>
+            </a:r>
+            <a:endParaRPr lang="en-US" sz="1200" dirty="0"/>
+          </a:p>
+        </p:txBody>
+      </p:sp>
+      <p:sp>
+        <p:nvSpPr>
+          <p:cNvPr id="60" name="Rectangle 59"/>
+          <p:cNvSpPr/>
+          <p:nvPr/>
+        </p:nvSpPr>
+        <p:spPr>
+          <a:xfrm>
+            <a:off x="4173898" y="4886129"/>
+            <a:ext cx="727788" cy="373223"/>
+          </a:xfrm>
+          <a:prstGeom prst="rect">
+            <a:avLst/>
+          </a:prstGeom>
+        </p:spPr>
+        <p:style>
+          <a:lnRef idx="1">
+            <a:schemeClr val="accent2"/>
+          </a:lnRef>
+          <a:fillRef idx="2">
+            <a:schemeClr val="accent2"/>
+          </a:fillRef>
+          <a:effectRef idx="1">
+            <a:schemeClr val="accent2"/>
+          </a:effectRef>
+          <a:fontRef idx="minor">
+            <a:schemeClr val="dk1"/>
+          </a:fontRef>
+        </p:style>
+        <p:txBody>
+          <a:bodyPr rtlCol="0" anchor="ctr"/>
+          <a:lstStyle/>
+          <a:p>
+            <a:pPr algn="ctr"/>
+            <a:r>
+              <a:rPr lang="en-US" sz="1200" dirty="0"/>
+              <a:t>5</a:t>
+            </a:r>
+            <a:r>
+              <a:rPr lang="en-US" sz="1200" dirty="0" smtClean="0"/>
+              <a:t> - May</a:t>
+            </a:r>
+            <a:endParaRPr lang="en-US" sz="1200" dirty="0"/>
+          </a:p>
+        </p:txBody>
+      </p:sp>
+      <p:sp>
+        <p:nvSpPr>
+          <p:cNvPr id="61" name="Rectangle 60"/>
+          <p:cNvSpPr/>
+          <p:nvPr/>
+        </p:nvSpPr>
+        <p:spPr>
+          <a:xfrm>
+            <a:off x="4970111" y="4886129"/>
+            <a:ext cx="727788" cy="373223"/>
+          </a:xfrm>
+          <a:prstGeom prst="rect">
+            <a:avLst/>
+          </a:prstGeom>
+        </p:spPr>
+        <p:style>
+          <a:lnRef idx="1">
+            <a:schemeClr val="accent2"/>
+          </a:lnRef>
+          <a:fillRef idx="2">
+            <a:schemeClr val="accent2"/>
+          </a:fillRef>
+          <a:effectRef idx="1">
+            <a:schemeClr val="accent2"/>
+          </a:effectRef>
+          <a:fontRef idx="minor">
+            <a:schemeClr val="dk1"/>
+          </a:fontRef>
+        </p:style>
+        <p:txBody>
+          <a:bodyPr rtlCol="0" anchor="ctr"/>
+          <a:lstStyle/>
+          <a:p>
+            <a:pPr algn="ctr"/>
+            <a:r>
+              <a:rPr lang="en-US" sz="1200" dirty="0" smtClean="0"/>
+              <a:t>6 - Jun</a:t>
+            </a:r>
+            <a:endParaRPr lang="en-US" sz="1200" dirty="0"/>
+          </a:p>
+        </p:txBody>
+      </p:sp>
+      <p:sp>
+        <p:nvSpPr>
+          <p:cNvPr id="62" name="Rectangle 61"/>
+          <p:cNvSpPr/>
+          <p:nvPr/>
+        </p:nvSpPr>
+        <p:spPr>
+          <a:xfrm>
+            <a:off x="5766324" y="4886129"/>
+            <a:ext cx="727788" cy="373223"/>
+          </a:xfrm>
+          <a:prstGeom prst="rect">
+            <a:avLst/>
+          </a:prstGeom>
+        </p:spPr>
+        <p:style>
+          <a:lnRef idx="1">
+            <a:schemeClr val="accent4"/>
+          </a:lnRef>
+          <a:fillRef idx="2">
+            <a:schemeClr val="accent4"/>
+          </a:fillRef>
+          <a:effectRef idx="1">
+            <a:schemeClr val="accent4"/>
+          </a:effectRef>
+          <a:fontRef idx="minor">
+            <a:schemeClr val="dk1"/>
+          </a:fontRef>
+        </p:style>
+        <p:txBody>
+          <a:bodyPr rtlCol="0" anchor="ctr"/>
+          <a:lstStyle/>
+          <a:p>
+            <a:pPr algn="ctr"/>
+            <a:r>
+              <a:rPr lang="en-US" sz="1200" dirty="0" smtClean="0"/>
+              <a:t>7 - Jul</a:t>
+            </a:r>
+            <a:endParaRPr lang="en-US" sz="1200" dirty="0"/>
+          </a:p>
+        </p:txBody>
+      </p:sp>
+      <p:sp>
+        <p:nvSpPr>
+          <p:cNvPr id="63" name="Rectangle 62"/>
+          <p:cNvSpPr/>
+          <p:nvPr/>
+        </p:nvSpPr>
+        <p:spPr>
+          <a:xfrm>
+            <a:off x="6562537" y="4886128"/>
+            <a:ext cx="727788" cy="373223"/>
+          </a:xfrm>
+          <a:prstGeom prst="rect">
+            <a:avLst/>
+          </a:prstGeom>
+        </p:spPr>
+        <p:style>
+          <a:lnRef idx="1">
+            <a:schemeClr val="accent4"/>
+          </a:lnRef>
+          <a:fillRef idx="2">
+            <a:schemeClr val="accent4"/>
+          </a:fillRef>
+          <a:effectRef idx="1">
+            <a:schemeClr val="accent4"/>
+          </a:effectRef>
+          <a:fontRef idx="minor">
+            <a:schemeClr val="dk1"/>
+          </a:fontRef>
+        </p:style>
+        <p:txBody>
+          <a:bodyPr rtlCol="0" anchor="ctr"/>
+          <a:lstStyle/>
+          <a:p>
+            <a:pPr algn="ctr"/>
+            <a:r>
+              <a:rPr lang="en-US" sz="1200" dirty="0"/>
+              <a:t>8</a:t>
+            </a:r>
+            <a:r>
+              <a:rPr lang="en-US" sz="1200" dirty="0" smtClean="0"/>
+              <a:t> - Aug</a:t>
+            </a:r>
+            <a:endParaRPr lang="en-US" sz="1200" dirty="0"/>
+          </a:p>
+        </p:txBody>
+      </p:sp>
+      <p:sp>
+        <p:nvSpPr>
+          <p:cNvPr id="64" name="Rectangle 63"/>
+          <p:cNvSpPr/>
+          <p:nvPr/>
+        </p:nvSpPr>
+        <p:spPr>
+          <a:xfrm>
+            <a:off x="7358750" y="4886128"/>
+            <a:ext cx="727788" cy="373223"/>
+          </a:xfrm>
+          <a:prstGeom prst="rect">
+            <a:avLst/>
+          </a:prstGeom>
+        </p:spPr>
+        <p:style>
+          <a:lnRef idx="1">
+            <a:schemeClr val="accent4"/>
+          </a:lnRef>
+          <a:fillRef idx="2">
+            <a:schemeClr val="accent4"/>
+          </a:fillRef>
+          <a:effectRef idx="1">
+            <a:schemeClr val="accent4"/>
+          </a:effectRef>
+          <a:fontRef idx="minor">
+            <a:schemeClr val="dk1"/>
+          </a:fontRef>
+        </p:style>
+        <p:txBody>
+          <a:bodyPr rtlCol="0" anchor="ctr"/>
+          <a:lstStyle/>
+          <a:p>
+            <a:pPr algn="ctr"/>
+            <a:r>
+              <a:rPr lang="en-US" sz="1200" dirty="0"/>
+              <a:t>9</a:t>
+            </a:r>
+            <a:r>
+              <a:rPr lang="en-US" sz="1200" dirty="0" smtClean="0"/>
+              <a:t> - Sep</a:t>
+            </a:r>
+            <a:endParaRPr lang="en-US" sz="1200" dirty="0"/>
+          </a:p>
+        </p:txBody>
+      </p:sp>
+      <p:sp>
+        <p:nvSpPr>
+          <p:cNvPr id="65" name="Rectangle 64"/>
+          <p:cNvSpPr/>
+          <p:nvPr/>
+        </p:nvSpPr>
+        <p:spPr>
+          <a:xfrm>
+            <a:off x="8154963" y="4886127"/>
+            <a:ext cx="727788" cy="373223"/>
+          </a:xfrm>
+          <a:prstGeom prst="rect">
+            <a:avLst/>
+          </a:prstGeom>
+        </p:spPr>
+        <p:style>
+          <a:lnRef idx="1">
+            <a:schemeClr val="accent6"/>
+          </a:lnRef>
+          <a:fillRef idx="2">
+            <a:schemeClr val="accent6"/>
+          </a:fillRef>
+          <a:effectRef idx="1">
+            <a:schemeClr val="accent6"/>
+          </a:effectRef>
+          <a:fontRef idx="minor">
+            <a:schemeClr val="dk1"/>
+          </a:fontRef>
+        </p:style>
+        <p:txBody>
+          <a:bodyPr rtlCol="0" anchor="ctr"/>
+          <a:lstStyle/>
+          <a:p>
+            <a:pPr algn="ctr"/>
+            <a:r>
+              <a:rPr lang="en-US" sz="1200" dirty="0" smtClean="0"/>
+              <a:t>10 - Oct</a:t>
+            </a:r>
+            <a:endParaRPr lang="en-US" sz="1200" dirty="0"/>
+          </a:p>
+        </p:txBody>
+      </p:sp>
+      <p:sp>
+        <p:nvSpPr>
+          <p:cNvPr id="66" name="Rectangle 65"/>
+          <p:cNvSpPr/>
+          <p:nvPr/>
+        </p:nvSpPr>
+        <p:spPr>
+          <a:xfrm>
+            <a:off x="8951176" y="4886128"/>
+            <a:ext cx="727788" cy="373223"/>
+          </a:xfrm>
+          <a:prstGeom prst="rect">
+            <a:avLst/>
+          </a:prstGeom>
+        </p:spPr>
+        <p:style>
+          <a:lnRef idx="1">
+            <a:schemeClr val="accent6"/>
+          </a:lnRef>
+          <a:fillRef idx="2">
+            <a:schemeClr val="accent6"/>
+          </a:fillRef>
+          <a:effectRef idx="1">
+            <a:schemeClr val="accent6"/>
+          </a:effectRef>
+          <a:fontRef idx="minor">
+            <a:schemeClr val="dk1"/>
+          </a:fontRef>
+        </p:style>
+        <p:txBody>
+          <a:bodyPr rtlCol="0" anchor="ctr"/>
+          <a:lstStyle/>
+          <a:p>
+            <a:pPr algn="ctr"/>
+            <a:r>
+              <a:rPr lang="en-US" sz="1200" dirty="0" smtClean="0"/>
+              <a:t>11 - Nov</a:t>
+            </a:r>
+            <a:endParaRPr lang="en-US" sz="1200" dirty="0"/>
+          </a:p>
+        </p:txBody>
+      </p:sp>
+      <p:sp>
+        <p:nvSpPr>
+          <p:cNvPr id="67" name="Rectangle 66"/>
+          <p:cNvSpPr/>
+          <p:nvPr/>
+        </p:nvSpPr>
+        <p:spPr>
+          <a:xfrm>
+            <a:off x="9747389" y="4886127"/>
+            <a:ext cx="727788" cy="373223"/>
+          </a:xfrm>
+          <a:prstGeom prst="rect">
+            <a:avLst/>
+          </a:prstGeom>
+        </p:spPr>
+        <p:style>
+          <a:lnRef idx="1">
+            <a:schemeClr val="accent6"/>
+          </a:lnRef>
+          <a:fillRef idx="2">
+            <a:schemeClr val="accent6"/>
+          </a:fillRef>
+          <a:effectRef idx="1">
+            <a:schemeClr val="accent6"/>
+          </a:effectRef>
+          <a:fontRef idx="minor">
+            <a:schemeClr val="dk1"/>
+          </a:fontRef>
+        </p:style>
+        <p:txBody>
+          <a:bodyPr rtlCol="0" anchor="ctr"/>
+          <a:lstStyle/>
+          <a:p>
+            <a:pPr algn="ctr"/>
+            <a:r>
+              <a:rPr lang="en-US" sz="1200" dirty="0" smtClean="0"/>
+              <a:t>12 - Dec</a:t>
+            </a:r>
+            <a:endParaRPr lang="en-US" sz="1200" dirty="0"/>
+          </a:p>
+        </p:txBody>
+      </p:sp>
+      <p:sp>
+        <p:nvSpPr>
+          <p:cNvPr id="68" name="Rectangle 67"/>
+          <p:cNvSpPr/>
+          <p:nvPr/>
+        </p:nvSpPr>
+        <p:spPr>
+          <a:xfrm>
+            <a:off x="783771" y="4578218"/>
+            <a:ext cx="9769151" cy="765109"/>
+          </a:xfrm>
+          <a:prstGeom prst="rect">
+            <a:avLst/>
+          </a:prstGeom>
+          <a:solidFill>
+            <a:schemeClr val="bg1">
+              <a:alpha val="80000"/>
+            </a:schemeClr>
+          </a:solidFill>
+          <a:ln w="9525" cap="flat" cmpd="sng" algn="ctr">
+            <a:solidFill>
+              <a:schemeClr val="dk1"/>
+            </a:solidFill>
+            <a:prstDash val="solid"/>
+            <a:round/>
+            <a:headEnd type="none" w="med" len="med"/>
+            <a:tailEnd type="none" w="med" len="med"/>
+          </a:ln>
+        </p:spPr>
+        <p:style>
+          <a:lnRef idx="0">
+            <a:scrgbClr r="0" g="0" b="0"/>
+          </a:lnRef>
+          <a:fillRef idx="0">
+            <a:scrgbClr r="0" g="0" b="0"/>
+          </a:fillRef>
+          <a:effectRef idx="0">
+            <a:scrgbClr r="0" g="0" b="0"/>
+          </a:effectRef>
+          <a:fontRef idx="minor">
+            <a:schemeClr val="dk1"/>
+          </a:fontRef>
+        </p:style>
+        <p:txBody>
+          <a:bodyPr rtlCol="0" anchor="t"/>
+          <a:lstStyle/>
+          <a:p>
+            <a:r>
+              <a:rPr lang="en-US" sz="1400" dirty="0" smtClean="0"/>
+              <a:t>2011</a:t>
+            </a:r>
+            <a:endParaRPr lang="en-US" sz="1400" dirty="0"/>
+          </a:p>
+        </p:txBody>
+      </p:sp>
+    </p:spTree>
+    <p:extLst>
+      <p:ext uri="{BB962C8B-B14F-4D97-AF65-F5344CB8AC3E}">
+        <p14:creationId xmlns:p14="http://schemas.microsoft.com/office/powerpoint/2010/main" val="1025938667"/>
+      </p:ext>
+    </p:extLst>
+  </p:cSld>
+  <p:clrMapOvr>
+    <a:masterClrMapping/>
+  </p:clrMapOvr>
+</p:sld>
+</file>
+
+<file path=ppt/slides/slide3.xml><?xml version="1.0" encoding="utf-8"?>
+<p:sld xmlns:a="http://schemas.openxmlformats.org/drawingml/2006/main" xmlns:r="http://schemas.openxmlformats.org/officeDocument/2006/relationships" xmlns:p="http://schemas.openxmlformats.org/presentationml/2006/main">
+  <p:cSld>
+    <p:spTree>
+      <p:nvGrpSpPr>
+        <p:cNvPr id="1" name=""/>
+        <p:cNvGrpSpPr/>
+        <p:nvPr/>
+      </p:nvGrpSpPr>
+      <p:grpSpPr>
+        <a:xfrm>
+          <a:off x="0" y="0"/>
+          <a:ext cx="0" cy="0"/>
+          <a:chOff x="0" y="0"/>
+          <a:chExt cx="0" cy="0"/>
+        </a:xfrm>
+      </p:grpSpPr>
+      <p:sp>
+        <p:nvSpPr>
+          <p:cNvPr id="2" name="Title 1"/>
+          <p:cNvSpPr>
+            <a:spLocks noGrp="1"/>
+          </p:cNvSpPr>
+          <p:nvPr>
+            <p:ph type="title"/>
+          </p:nvPr>
+        </p:nvSpPr>
+        <p:spPr/>
+        <p:txBody>
+          <a:bodyPr/>
+          <a:lstStyle/>
+          <a:p>
+            <a:r>
+              <a:rPr lang="en-US" smtClean="0"/>
+              <a:t>Domain </a:t>
+            </a:r>
+            <a:r>
+              <a:rPr lang="en-US" dirty="0" smtClean="0"/>
+              <a:t>Model Diagram</a:t>
+            </a:r>
+            <a:endParaRPr lang="en-US" dirty="0"/>
+          </a:p>
+        </p:txBody>
+      </p:sp>
+      <p:sp>
+        <p:nvSpPr>
+          <p:cNvPr id="3" name="Content Placeholder 2"/>
+          <p:cNvSpPr>
+            <a:spLocks noGrp="1"/>
+          </p:cNvSpPr>
+          <p:nvPr>
+            <p:ph idx="1"/>
+          </p:nvPr>
+        </p:nvSpPr>
+        <p:spPr/>
+        <p:txBody>
+          <a:bodyPr/>
+          <a:lstStyle/>
+          <a:p>
+            <a:endParaRPr lang="en-US"/>
+          </a:p>
+        </p:txBody>
+      </p:sp>
+    </p:spTree>
+    <p:extLst>
+      <p:ext uri="{BB962C8B-B14F-4D97-AF65-F5344CB8AC3E}">
+        <p14:creationId xmlns:p14="http://schemas.microsoft.com/office/powerpoint/2010/main" val="1596925341"/>
+      </p:ext>
+    </p:extLst>
+  </p:cSld>
+  <p:clrMapOvr>
+    <a:masterClrMapping/>
+  </p:clrMapOvr>
+</p:sld>
+</file>
+
 <file path=ppt/theme/theme1.xml><?xml version="1.0" encoding="utf-8"?>
 <a:theme xmlns:a="http://schemas.openxmlformats.org/drawingml/2006/main" name="Office Theme">
   <a:themeElements>

</xml_diff>